<commit_message>
Site updated at 2014-06-05 11:11:22 UTC
</commit_message>
<xml_diff>
--- a/slides/ppt/msr14-so.pptx
+++ b/slides/ppt/msr14-so.pptx
@@ -5,41 +5,42 @@
     <p:sldMasterId id="2147483902" r:id="rId1"/>
   </p:sldMasterIdLst>
   <p:notesMasterIdLst>
-    <p:notesMasterId r:id="rId31"/>
+    <p:notesMasterId r:id="rId32"/>
   </p:notesMasterIdLst>
   <p:handoutMasterIdLst>
-    <p:handoutMasterId r:id="rId32"/>
+    <p:handoutMasterId r:id="rId33"/>
   </p:handoutMasterIdLst>
   <p:sldIdLst>
     <p:sldId id="257" r:id="rId2"/>
-    <p:sldId id="259" r:id="rId3"/>
-    <p:sldId id="260" r:id="rId4"/>
-    <p:sldId id="283" r:id="rId5"/>
-    <p:sldId id="294" r:id="rId6"/>
-    <p:sldId id="261" r:id="rId7"/>
-    <p:sldId id="284" r:id="rId8"/>
-    <p:sldId id="263" r:id="rId9"/>
-    <p:sldId id="285" r:id="rId10"/>
-    <p:sldId id="264" r:id="rId11"/>
-    <p:sldId id="305" r:id="rId12"/>
-    <p:sldId id="265" r:id="rId13"/>
-    <p:sldId id="302" r:id="rId14"/>
-    <p:sldId id="274" r:id="rId15"/>
-    <p:sldId id="279" r:id="rId16"/>
-    <p:sldId id="275" r:id="rId17"/>
-    <p:sldId id="280" r:id="rId18"/>
-    <p:sldId id="276" r:id="rId19"/>
-    <p:sldId id="281" r:id="rId20"/>
-    <p:sldId id="277" r:id="rId21"/>
-    <p:sldId id="282" r:id="rId22"/>
-    <p:sldId id="290" r:id="rId23"/>
-    <p:sldId id="289" r:id="rId24"/>
-    <p:sldId id="286" r:id="rId25"/>
-    <p:sldId id="304" r:id="rId26"/>
-    <p:sldId id="278" r:id="rId27"/>
-    <p:sldId id="291" r:id="rId28"/>
-    <p:sldId id="293" r:id="rId29"/>
-    <p:sldId id="258" r:id="rId30"/>
+    <p:sldId id="306" r:id="rId3"/>
+    <p:sldId id="259" r:id="rId4"/>
+    <p:sldId id="260" r:id="rId5"/>
+    <p:sldId id="283" r:id="rId6"/>
+    <p:sldId id="294" r:id="rId7"/>
+    <p:sldId id="261" r:id="rId8"/>
+    <p:sldId id="284" r:id="rId9"/>
+    <p:sldId id="263" r:id="rId10"/>
+    <p:sldId id="285" r:id="rId11"/>
+    <p:sldId id="264" r:id="rId12"/>
+    <p:sldId id="305" r:id="rId13"/>
+    <p:sldId id="265" r:id="rId14"/>
+    <p:sldId id="302" r:id="rId15"/>
+    <p:sldId id="274" r:id="rId16"/>
+    <p:sldId id="279" r:id="rId17"/>
+    <p:sldId id="275" r:id="rId18"/>
+    <p:sldId id="280" r:id="rId19"/>
+    <p:sldId id="276" r:id="rId20"/>
+    <p:sldId id="281" r:id="rId21"/>
+    <p:sldId id="277" r:id="rId22"/>
+    <p:sldId id="282" r:id="rId23"/>
+    <p:sldId id="290" r:id="rId24"/>
+    <p:sldId id="289" r:id="rId25"/>
+    <p:sldId id="286" r:id="rId26"/>
+    <p:sldId id="304" r:id="rId27"/>
+    <p:sldId id="278" r:id="rId28"/>
+    <p:sldId id="291" r:id="rId29"/>
+    <p:sldId id="293" r:id="rId30"/>
+    <p:sldId id="258" r:id="rId31"/>
   </p:sldIdLst>
   <p:sldSz cx="9144000" cy="6858000" type="screen4x3"/>
   <p:notesSz cx="6858000" cy="9144000"/>
@@ -3305,6 +3306,14 @@
           <a:bodyPr/>
           <a:lstStyle/>
           <a:p>
+            <a:r>
+              <a:rPr lang="en-US" dirty="0" smtClean="0"/>
+              <a:t>In total there are more than 500 thousand questions available</a:t>
+            </a:r>
+            <a:r>
+              <a:rPr lang="en-US" baseline="0" dirty="0" smtClean="0"/>
+              <a:t> on stack overflow pertaining to web applications</a:t>
+            </a:r>
             <a:endParaRPr lang="en-US" dirty="0"/>
           </a:p>
         </p:txBody>
@@ -3335,7 +3344,7 @@
     </p:spTree>
     <p:extLst>
       <p:ext uri="{BB962C8B-B14F-4D97-AF65-F5344CB8AC3E}">
-        <p14:creationId xmlns:p14="http://schemas.microsoft.com/office/powerpoint/2010/main" val="577440848"/>
+        <p14:creationId xmlns:p14="http://schemas.microsoft.com/office/powerpoint/2010/main" val="1412145102"/>
       </p:ext>
     </p:extLst>
   </p:cSld>
@@ -3389,47 +3398,7 @@
           <a:bodyPr/>
           <a:lstStyle/>
           <a:p>
-            <a:r>
-              <a:rPr lang="en-US" dirty="0" smtClean="0"/>
-              <a:t>What</a:t>
-            </a:r>
-            <a:r>
-              <a:rPr lang="en-US" baseline="0" dirty="0" smtClean="0"/>
-              <a:t> are we missing in this finding?</a:t>
-            </a:r>
-          </a:p>
-          <a:p>
-            <a:endParaRPr lang="en-US" baseline="0" dirty="0" smtClean="0"/>
-          </a:p>
-          <a:p>
-            <a:r>
-              <a:rPr lang="en-US" baseline="0" dirty="0" smtClean="0"/>
-              <a:t>How does a web developer search for solution?</a:t>
-            </a:r>
-          </a:p>
-          <a:p>
-            <a:endParaRPr lang="en-US" baseline="0" dirty="0" smtClean="0"/>
-          </a:p>
-          <a:p>
-            <a:r>
-              <a:rPr lang="en-US" baseline="0" dirty="0" smtClean="0"/>
-              <a:t>In some scenarios solution is readily available online</a:t>
-            </a:r>
-          </a:p>
-          <a:p>
-            <a:r>
-              <a:rPr lang="en-US" baseline="0" dirty="0" smtClean="0"/>
-              <a:t>so there is no more discussion related to these topics..</a:t>
-            </a:r>
-          </a:p>
-          <a:p>
-            <a:r>
-              <a:rPr lang="en-US" baseline="0" dirty="0" smtClean="0"/>
-              <a:t>How to count these factors?</a:t>
-            </a:r>
-          </a:p>
-          <a:p>
-            <a:endParaRPr lang="en-US" baseline="0" dirty="0" smtClean="0"/>
+            <a:endParaRPr lang="en-US" dirty="0"/>
           </a:p>
         </p:txBody>
       </p:sp>
@@ -3459,7 +3428,7 @@
     </p:spTree>
     <p:extLst>
       <p:ext uri="{BB962C8B-B14F-4D97-AF65-F5344CB8AC3E}">
-        <p14:creationId xmlns:p14="http://schemas.microsoft.com/office/powerpoint/2010/main" val="3419395652"/>
+        <p14:creationId xmlns:p14="http://schemas.microsoft.com/office/powerpoint/2010/main" val="577440848"/>
       </p:ext>
     </p:extLst>
   </p:cSld>
@@ -3513,7 +3482,47 @@
           <a:bodyPr/>
           <a:lstStyle/>
           <a:p>
-            <a:endParaRPr lang="en-US" dirty="0"/>
+            <a:r>
+              <a:rPr lang="en-US" dirty="0" smtClean="0"/>
+              <a:t>What</a:t>
+            </a:r>
+            <a:r>
+              <a:rPr lang="en-US" baseline="0" dirty="0" smtClean="0"/>
+              <a:t> are we missing in this finding?</a:t>
+            </a:r>
+          </a:p>
+          <a:p>
+            <a:endParaRPr lang="en-US" baseline="0" dirty="0" smtClean="0"/>
+          </a:p>
+          <a:p>
+            <a:r>
+              <a:rPr lang="en-US" baseline="0" dirty="0" smtClean="0"/>
+              <a:t>How does a web developer search for solution?</a:t>
+            </a:r>
+          </a:p>
+          <a:p>
+            <a:endParaRPr lang="en-US" baseline="0" dirty="0" smtClean="0"/>
+          </a:p>
+          <a:p>
+            <a:r>
+              <a:rPr lang="en-US" baseline="0" dirty="0" smtClean="0"/>
+              <a:t>In some scenarios solution is readily available online</a:t>
+            </a:r>
+          </a:p>
+          <a:p>
+            <a:r>
+              <a:rPr lang="en-US" baseline="0" dirty="0" smtClean="0"/>
+              <a:t>so there is no more discussion related to these topics..</a:t>
+            </a:r>
+          </a:p>
+          <a:p>
+            <a:r>
+              <a:rPr lang="en-US" baseline="0" dirty="0" smtClean="0"/>
+              <a:t>How to count these factors?</a:t>
+            </a:r>
+          </a:p>
+          <a:p>
+            <a:endParaRPr lang="en-US" baseline="0" dirty="0" smtClean="0"/>
           </a:p>
         </p:txBody>
       </p:sp>
@@ -3543,7 +3552,7 @@
     </p:spTree>
     <p:extLst>
       <p:ext uri="{BB962C8B-B14F-4D97-AF65-F5344CB8AC3E}">
-        <p14:creationId xmlns:p14="http://schemas.microsoft.com/office/powerpoint/2010/main" val="2215880595"/>
+        <p14:creationId xmlns:p14="http://schemas.microsoft.com/office/powerpoint/2010/main" val="3419395652"/>
       </p:ext>
     </p:extLst>
   </p:cSld>
@@ -3681,113 +3690,7 @@
           <a:bodyPr/>
           <a:lstStyle/>
           <a:p>
-            <a:r>
-              <a:rPr lang="en-US" dirty="0" smtClean="0"/>
-              <a:t>In finding 1 we saw</a:t>
-            </a:r>
-            <a:r>
-              <a:rPr lang="en-US" baseline="0" dirty="0" smtClean="0"/>
-              <a:t> the prevalence of cross browser related issues..</a:t>
-            </a:r>
-          </a:p>
-          <a:p>
-            <a:endParaRPr lang="en-US" baseline="0" dirty="0" smtClean="0"/>
-          </a:p>
-          <a:p>
-            <a:r>
-              <a:rPr lang="en-US" baseline="0" dirty="0" smtClean="0"/>
-              <a:t>but here we can see that discussions related to cross browser issues are declining over time</a:t>
-            </a:r>
-          </a:p>
-          <a:p>
-            <a:endParaRPr lang="en-US" baseline="0" dirty="0" smtClean="0"/>
-          </a:p>
-          <a:p>
-            <a:r>
-              <a:rPr lang="en-US" baseline="0" dirty="0" smtClean="0"/>
-              <a:t>either browsers are becoming consistent or solutions are readily available over the internet.</a:t>
-            </a:r>
-          </a:p>
-          <a:p>
-            <a:r>
-              <a:rPr lang="en-US" baseline="0" dirty="0" smtClean="0"/>
-              <a:t>----- Meeting Notes (2014-05-16 15:23) -----</a:t>
-            </a:r>
-          </a:p>
-          <a:p>
-            <a:r>
-              <a:rPr lang="en-US" baseline="0" dirty="0" smtClean="0"/>
-              <a:t>top 20</a:t>
-            </a:r>
-          </a:p>
-          <a:p>
-            <a:endParaRPr lang="en-US" baseline="0" dirty="0" smtClean="0"/>
-          </a:p>
-          <a:p>
-            <a:r>
-              <a:rPr lang="en-US" baseline="0" dirty="0" smtClean="0"/>
-              <a:t>how are the results gonna be used</a:t>
-            </a:r>
-          </a:p>
-          <a:p>
-            <a:endParaRPr lang="en-US" baseline="0" dirty="0" smtClean="0"/>
-          </a:p>
-          <a:p>
-            <a:r>
-              <a:rPr lang="en-US" baseline="0" dirty="0" smtClean="0"/>
-              <a:t>becoming more popular</a:t>
-            </a:r>
-          </a:p>
-          <a:p>
-            <a:endParaRPr lang="en-US" baseline="0" dirty="0" smtClean="0"/>
-          </a:p>
-          <a:p>
-            <a:r>
-              <a:rPr lang="en-US" baseline="0" dirty="0" smtClean="0"/>
-              <a:t>after the application has been released</a:t>
-            </a:r>
-          </a:p>
-          <a:p>
-            <a:endParaRPr lang="en-US" baseline="0" dirty="0" smtClean="0"/>
-          </a:p>
-          <a:p>
-            <a:r>
-              <a:rPr lang="en-US" baseline="0" dirty="0" smtClean="0"/>
-              <a:t>can we understand developer's misconceptions</a:t>
-            </a:r>
-          </a:p>
-          <a:p>
-            <a:endParaRPr lang="en-US" baseline="0" dirty="0" smtClean="0"/>
-          </a:p>
-          <a:p>
-            <a:r>
-              <a:rPr lang="en-US" baseline="0" dirty="0" smtClean="0"/>
-              <a:t>avoid like, so, etc</a:t>
-            </a:r>
-          </a:p>
-          <a:p>
-            <a:r>
-              <a:rPr lang="en-US" baseline="0" dirty="0" smtClean="0"/>
-              <a:t>1414</a:t>
-            </a:r>
-          </a:p>
-          <a:p>
-            <a:r>
-              <a:rPr lang="en-US" baseline="0" dirty="0" smtClean="0"/>
-              <a:t>look at audience</a:t>
-            </a:r>
-          </a:p>
-          <a:p>
-            <a:endParaRPr lang="en-US" baseline="0" dirty="0" smtClean="0"/>
-          </a:p>
-          <a:p>
-            <a:r>
-              <a:rPr lang="en-US" baseline="0" dirty="0" smtClean="0"/>
-              <a:t>MSR</a:t>
-            </a:r>
-          </a:p>
-          <a:p>
-            <a:endParaRPr lang="en-US" baseline="0" dirty="0" smtClean="0"/>
+            <a:endParaRPr lang="en-US" dirty="0"/>
           </a:p>
         </p:txBody>
       </p:sp>
@@ -3817,7 +3720,7 @@
     </p:spTree>
     <p:extLst>
       <p:ext uri="{BB962C8B-B14F-4D97-AF65-F5344CB8AC3E}">
-        <p14:creationId xmlns:p14="http://schemas.microsoft.com/office/powerpoint/2010/main" val="2207095821"/>
+        <p14:creationId xmlns:p14="http://schemas.microsoft.com/office/powerpoint/2010/main" val="2215880595"/>
       </p:ext>
     </p:extLst>
   </p:cSld>
@@ -3873,6 +3776,196 @@
           <a:p>
             <a:r>
               <a:rPr lang="en-US" dirty="0" smtClean="0"/>
+              <a:t>In finding 1 we saw</a:t>
+            </a:r>
+            <a:r>
+              <a:rPr lang="en-US" baseline="0" dirty="0" smtClean="0"/>
+              <a:t> the prevalence of cross browser related issues..</a:t>
+            </a:r>
+          </a:p>
+          <a:p>
+            <a:endParaRPr lang="en-US" baseline="0" dirty="0" smtClean="0"/>
+          </a:p>
+          <a:p>
+            <a:r>
+              <a:rPr lang="en-US" baseline="0" dirty="0" smtClean="0"/>
+              <a:t>but here we can see that discussions related to cross browser issues are declining over time</a:t>
+            </a:r>
+          </a:p>
+          <a:p>
+            <a:endParaRPr lang="en-US" baseline="0" dirty="0" smtClean="0"/>
+          </a:p>
+          <a:p>
+            <a:r>
+              <a:rPr lang="en-US" baseline="0" dirty="0" smtClean="0"/>
+              <a:t>either browsers are becoming consistent or solutions are readily available over the internet.</a:t>
+            </a:r>
+          </a:p>
+          <a:p>
+            <a:r>
+              <a:rPr lang="en-US" baseline="0" dirty="0" smtClean="0"/>
+              <a:t>----- Meeting Notes (2014-05-16 15:23) -----</a:t>
+            </a:r>
+          </a:p>
+          <a:p>
+            <a:r>
+              <a:rPr lang="en-US" baseline="0" dirty="0" smtClean="0"/>
+              <a:t>top 20</a:t>
+            </a:r>
+          </a:p>
+          <a:p>
+            <a:endParaRPr lang="en-US" baseline="0" dirty="0" smtClean="0"/>
+          </a:p>
+          <a:p>
+            <a:r>
+              <a:rPr lang="en-US" baseline="0" dirty="0" smtClean="0"/>
+              <a:t>how are the results gonna be used</a:t>
+            </a:r>
+          </a:p>
+          <a:p>
+            <a:endParaRPr lang="en-US" baseline="0" dirty="0" smtClean="0"/>
+          </a:p>
+          <a:p>
+            <a:r>
+              <a:rPr lang="en-US" baseline="0" dirty="0" smtClean="0"/>
+              <a:t>becoming more popular</a:t>
+            </a:r>
+          </a:p>
+          <a:p>
+            <a:endParaRPr lang="en-US" baseline="0" dirty="0" smtClean="0"/>
+          </a:p>
+          <a:p>
+            <a:r>
+              <a:rPr lang="en-US" baseline="0" dirty="0" smtClean="0"/>
+              <a:t>after the application has been released</a:t>
+            </a:r>
+          </a:p>
+          <a:p>
+            <a:endParaRPr lang="en-US" baseline="0" dirty="0" smtClean="0"/>
+          </a:p>
+          <a:p>
+            <a:r>
+              <a:rPr lang="en-US" baseline="0" dirty="0" smtClean="0"/>
+              <a:t>can we understand developer's misconceptions</a:t>
+            </a:r>
+          </a:p>
+          <a:p>
+            <a:endParaRPr lang="en-US" baseline="0" dirty="0" smtClean="0"/>
+          </a:p>
+          <a:p>
+            <a:r>
+              <a:rPr lang="en-US" baseline="0" dirty="0" smtClean="0"/>
+              <a:t>avoid like, so, etc</a:t>
+            </a:r>
+          </a:p>
+          <a:p>
+            <a:r>
+              <a:rPr lang="en-US" baseline="0" dirty="0" smtClean="0"/>
+              <a:t>1414</a:t>
+            </a:r>
+          </a:p>
+          <a:p>
+            <a:r>
+              <a:rPr lang="en-US" baseline="0" dirty="0" smtClean="0"/>
+              <a:t>look at audience</a:t>
+            </a:r>
+          </a:p>
+          <a:p>
+            <a:endParaRPr lang="en-US" baseline="0" dirty="0" smtClean="0"/>
+          </a:p>
+          <a:p>
+            <a:r>
+              <a:rPr lang="en-US" baseline="0" dirty="0" smtClean="0"/>
+              <a:t>MSR</a:t>
+            </a:r>
+          </a:p>
+          <a:p>
+            <a:endParaRPr lang="en-US" baseline="0" dirty="0" smtClean="0"/>
+          </a:p>
+        </p:txBody>
+      </p:sp>
+      <p:sp>
+        <p:nvSpPr>
+          <p:cNvPr id="4" name="Slide Number Placeholder 3"/>
+          <p:cNvSpPr>
+            <a:spLocks noGrp="1"/>
+          </p:cNvSpPr>
+          <p:nvPr>
+            <p:ph type="sldNum" sz="quarter" idx="10"/>
+          </p:nvPr>
+        </p:nvSpPr>
+        <p:spPr/>
+        <p:txBody>
+          <a:bodyPr/>
+          <a:lstStyle/>
+          <a:p>
+            <a:fld id="{3CFCBF25-E5F4-8D4E-B113-BA53DF871735}" type="slidenum">
+              <a:rPr lang="en-US" smtClean="0"/>
+              <a:t>18</a:t>
+            </a:fld>
+            <a:endParaRPr lang="en-US"/>
+          </a:p>
+        </p:txBody>
+      </p:sp>
+    </p:spTree>
+    <p:extLst>
+      <p:ext uri="{BB962C8B-B14F-4D97-AF65-F5344CB8AC3E}">
+        <p14:creationId xmlns:p14="http://schemas.microsoft.com/office/powerpoint/2010/main" val="2207095821"/>
+      </p:ext>
+    </p:extLst>
+  </p:cSld>
+  <p:clrMapOvr>
+    <a:masterClrMapping/>
+  </p:clrMapOvr>
+</p:notes>
+</file>
+
+<file path=ppt/notesSlides/notesSlide16.xml><?xml version="1.0" encoding="utf-8"?>
+<p:notes xmlns:a="http://schemas.openxmlformats.org/drawingml/2006/main" xmlns:r="http://schemas.openxmlformats.org/officeDocument/2006/relationships" xmlns:p="http://schemas.openxmlformats.org/presentationml/2006/main">
+  <p:cSld>
+    <p:spTree>
+      <p:nvGrpSpPr>
+        <p:cNvPr id="1" name=""/>
+        <p:cNvGrpSpPr/>
+        <p:nvPr/>
+      </p:nvGrpSpPr>
+      <p:grpSpPr>
+        <a:xfrm>
+          <a:off x="0" y="0"/>
+          <a:ext cx="0" cy="0"/>
+          <a:chOff x="0" y="0"/>
+          <a:chExt cx="0" cy="0"/>
+        </a:xfrm>
+      </p:grpSpPr>
+      <p:sp>
+        <p:nvSpPr>
+          <p:cNvPr id="2" name="Slide Image Placeholder 1"/>
+          <p:cNvSpPr>
+            <a:spLocks noGrp="1" noRot="1" noChangeAspect="1"/>
+          </p:cNvSpPr>
+          <p:nvPr>
+            <p:ph type="sldImg"/>
+          </p:nvPr>
+        </p:nvSpPr>
+        <p:spPr/>
+      </p:sp>
+      <p:sp>
+        <p:nvSpPr>
+          <p:cNvPr id="3" name="Notes Placeholder 2"/>
+          <p:cNvSpPr>
+            <a:spLocks noGrp="1"/>
+          </p:cNvSpPr>
+          <p:nvPr>
+            <p:ph type="body" idx="1"/>
+          </p:nvPr>
+        </p:nvSpPr>
+        <p:spPr/>
+        <p:txBody>
+          <a:bodyPr/>
+          <a:lstStyle/>
+          <a:p>
+            <a:r>
+              <a:rPr lang="en-US" dirty="0" smtClean="0"/>
               <a:t>Here we present anecdotal </a:t>
             </a:r>
             <a:r>
@@ -3900,7 +3993,7 @@
           <a:p>
             <a:fld id="{3CFCBF25-E5F4-8D4E-B113-BA53DF871735}" type="slidenum">
               <a:rPr lang="en-US" smtClean="0"/>
-              <a:t>25</a:t>
+              <a:t>26</a:t>
             </a:fld>
             <a:endParaRPr lang="en-US"/>
           </a:p>
@@ -3963,48 +4056,6 @@
           <a:bodyPr/>
           <a:lstStyle/>
           <a:p>
-            <a:r>
-              <a:rPr lang="en-US" dirty="0" smtClean="0"/>
-              <a:t>prior</a:t>
-            </a:r>
-            <a:r>
-              <a:rPr lang="en-US" baseline="0" dirty="0" smtClean="0"/>
-              <a:t> work has shown the prevalence of </a:t>
-            </a:r>
-            <a:r>
-              <a:rPr lang="en-US" baseline="0" dirty="0" err="1" smtClean="0"/>
-              <a:t>javascript</a:t>
-            </a:r>
-            <a:r>
-              <a:rPr lang="en-US" baseline="0" dirty="0" smtClean="0"/>
-              <a:t> errors in productions web sites..</a:t>
-            </a:r>
-          </a:p>
-          <a:p>
-            <a:endParaRPr lang="en-US" baseline="0" dirty="0" smtClean="0"/>
-          </a:p>
-          <a:p>
-            <a:r>
-              <a:rPr lang="en-US" baseline="0" dirty="0" smtClean="0"/>
-              <a:t>and also demonstrated the ad-hoc nature of </a:t>
-            </a:r>
-            <a:r>
-              <a:rPr lang="en-US" baseline="0" dirty="0" err="1" smtClean="0"/>
-              <a:t>css</a:t>
-            </a:r>
-            <a:r>
-              <a:rPr lang="en-US" baseline="0" dirty="0" smtClean="0"/>
-              <a:t> files…</a:t>
-            </a:r>
-          </a:p>
-          <a:p>
-            <a:endParaRPr lang="en-US" baseline="0" dirty="0" smtClean="0"/>
-          </a:p>
-          <a:p>
-            <a:r>
-              <a:rPr lang="en-US" baseline="0" dirty="0" smtClean="0"/>
-              <a:t> </a:t>
-            </a:r>
             <a:endParaRPr lang="en-US" dirty="0"/>
           </a:p>
         </p:txBody>
@@ -4035,7 +4086,7 @@
     </p:spTree>
     <p:extLst>
       <p:ext uri="{BB962C8B-B14F-4D97-AF65-F5344CB8AC3E}">
-        <p14:creationId xmlns:p14="http://schemas.microsoft.com/office/powerpoint/2010/main" val="110193629"/>
+        <p14:creationId xmlns:p14="http://schemas.microsoft.com/office/powerpoint/2010/main" val="3895936723"/>
       </p:ext>
     </p:extLst>
   </p:cSld>
@@ -4091,11 +4142,19 @@
           <a:p>
             <a:r>
               <a:rPr lang="en-US" dirty="0" smtClean="0"/>
-              <a:t>no work has been that focus on analyzing </a:t>
+              <a:t>prior</a:t>
             </a:r>
             <a:r>
               <a:rPr lang="en-US" baseline="0" dirty="0" smtClean="0"/>
-              <a:t>what web developers discuss and talk about</a:t>
+              <a:t> work has shown the prevalence of </a:t>
+            </a:r>
+            <a:r>
+              <a:rPr lang="en-US" baseline="0" dirty="0" err="1" smtClean="0"/>
+              <a:t>javascript</a:t>
+            </a:r>
+            <a:r>
+              <a:rPr lang="en-US" baseline="0" dirty="0" smtClean="0"/>
+              <a:t> errors in productions web sites..</a:t>
             </a:r>
           </a:p>
           <a:p>
@@ -4104,7 +4163,15 @@
           <a:p>
             <a:r>
               <a:rPr lang="en-US" baseline="0" dirty="0" smtClean="0"/>
-              <a:t>new developments or existing technologies</a:t>
+              <a:t>and also demonstrated the ad-hoc nature of </a:t>
+            </a:r>
+            <a:r>
+              <a:rPr lang="en-US" baseline="0" dirty="0" err="1" smtClean="0"/>
+              <a:t>css</a:t>
+            </a:r>
+            <a:r>
+              <a:rPr lang="en-US" baseline="0" dirty="0" smtClean="0"/>
+              <a:t> files…</a:t>
             </a:r>
           </a:p>
           <a:p>
@@ -4113,7 +4180,7 @@
           <a:p>
             <a:r>
               <a:rPr lang="en-US" baseline="0" dirty="0" smtClean="0"/>
-              <a:t>How is the discussion being affected by the advancement in technology</a:t>
+              <a:t> </a:t>
             </a:r>
             <a:endParaRPr lang="en-US" dirty="0"/>
           </a:p>
@@ -4145,7 +4212,7 @@
     </p:spTree>
     <p:extLst>
       <p:ext uri="{BB962C8B-B14F-4D97-AF65-F5344CB8AC3E}">
-        <p14:creationId xmlns:p14="http://schemas.microsoft.com/office/powerpoint/2010/main" val="2078512979"/>
+        <p14:creationId xmlns:p14="http://schemas.microsoft.com/office/powerpoint/2010/main" val="110193629"/>
       </p:ext>
     </p:extLst>
   </p:cSld>
@@ -4201,11 +4268,11 @@
           <a:p>
             <a:r>
               <a:rPr lang="en-US" dirty="0" smtClean="0"/>
-              <a:t>We basically focus on analyzing</a:t>
+              <a:t>no work has been that focus on analyzing </a:t>
             </a:r>
             <a:r>
               <a:rPr lang="en-US" baseline="0" dirty="0" smtClean="0"/>
-              <a:t> what web developers discuss and talk about?</a:t>
+              <a:t>what web developers discuss and talk about</a:t>
             </a:r>
           </a:p>
           <a:p>
@@ -4214,7 +4281,7 @@
           <a:p>
             <a:r>
               <a:rPr lang="en-US" baseline="0" dirty="0" smtClean="0"/>
-              <a:t>new developments or existing technologies? </a:t>
+              <a:t>new developments or existing technologies</a:t>
             </a:r>
           </a:p>
           <a:p>
@@ -4223,13 +4290,8 @@
           <a:p>
             <a:r>
               <a:rPr lang="en-US" baseline="0" dirty="0" smtClean="0"/>
-              <a:t>How is the discussion being affected by the advancement in technology?</a:t>
-            </a:r>
-          </a:p>
-          <a:p>
-            <a:endParaRPr lang="en-US" baseline="0" dirty="0" smtClean="0"/>
-          </a:p>
-          <a:p>
+              <a:t>How is the discussion being affected by the advancement in technology</a:t>
+            </a:r>
             <a:endParaRPr lang="en-US" dirty="0"/>
           </a:p>
         </p:txBody>
@@ -4316,11 +4378,11 @@
           <a:p>
             <a:r>
               <a:rPr lang="en-US" dirty="0" smtClean="0"/>
-              <a:t>We want to take the words</a:t>
+              <a:t>We basically focus on analyzing</a:t>
             </a:r>
             <a:r>
               <a:rPr lang="en-US" baseline="0" dirty="0" smtClean="0"/>
-              <a:t> spoken by a developer and analyze the root cause of the understanding. </a:t>
+              <a:t> what web developers discuss and talk about?</a:t>
             </a:r>
           </a:p>
           <a:p>
@@ -4329,49 +4391,20 @@
           <a:p>
             <a:r>
               <a:rPr lang="en-US" baseline="0" dirty="0" smtClean="0"/>
-              <a:t>Talk about the following points here:</a:t>
-            </a:r>
+              <a:t>new developments or existing technologies? </a:t>
+            </a:r>
+          </a:p>
+          <a:p>
+            <a:endParaRPr lang="en-US" baseline="0" dirty="0" smtClean="0"/>
           </a:p>
           <a:p>
             <a:r>
               <a:rPr lang="en-US" baseline="0" dirty="0" smtClean="0"/>
-              <a:t>how are the results </a:t>
-            </a:r>
-            <a:r>
-              <a:rPr lang="en-US" baseline="0" dirty="0" err="1" smtClean="0"/>
-              <a:t>gonna</a:t>
-            </a:r>
-            <a:r>
-              <a:rPr lang="en-US" baseline="0" dirty="0" smtClean="0"/>
-              <a:t> be used</a:t>
+              <a:t>How is the discussion being affected by the advancement in technology?</a:t>
             </a:r>
           </a:p>
           <a:p>
             <a:endParaRPr lang="en-US" baseline="0" dirty="0" smtClean="0"/>
-          </a:p>
-          <a:p>
-            <a:r>
-              <a:rPr lang="en-US" baseline="0" dirty="0" smtClean="0"/>
-              <a:t>becoming more popular</a:t>
-            </a:r>
-          </a:p>
-          <a:p>
-            <a:endParaRPr lang="en-US" baseline="0" dirty="0" smtClean="0"/>
-          </a:p>
-          <a:p>
-            <a:r>
-              <a:rPr lang="en-US" baseline="0" dirty="0" smtClean="0"/>
-              <a:t>after the application has been released</a:t>
-            </a:r>
-          </a:p>
-          <a:p>
-            <a:endParaRPr lang="en-US" baseline="0" dirty="0" smtClean="0"/>
-          </a:p>
-          <a:p>
-            <a:r>
-              <a:rPr lang="en-US" baseline="0" dirty="0" smtClean="0"/>
-              <a:t>can we understand developer's misconceptions</a:t>
-            </a:r>
           </a:p>
           <a:p>
             <a:endParaRPr lang="en-US" dirty="0"/>
@@ -4404,7 +4437,7 @@
     </p:spTree>
     <p:extLst>
       <p:ext uri="{BB962C8B-B14F-4D97-AF65-F5344CB8AC3E}">
-        <p14:creationId xmlns:p14="http://schemas.microsoft.com/office/powerpoint/2010/main" val="2065749234"/>
+        <p14:creationId xmlns:p14="http://schemas.microsoft.com/office/powerpoint/2010/main" val="2078512979"/>
       </p:ext>
     </p:extLst>
   </p:cSld>
@@ -4458,6 +4491,66 @@
           <a:bodyPr/>
           <a:lstStyle/>
           <a:p>
+            <a:r>
+              <a:rPr lang="en-US" dirty="0" smtClean="0"/>
+              <a:t>We want to take the words</a:t>
+            </a:r>
+            <a:r>
+              <a:rPr lang="en-US" baseline="0" dirty="0" smtClean="0"/>
+              <a:t> spoken by a developer and analyze the root cause of the understanding. </a:t>
+            </a:r>
+          </a:p>
+          <a:p>
+            <a:endParaRPr lang="en-US" baseline="0" dirty="0" smtClean="0"/>
+          </a:p>
+          <a:p>
+            <a:r>
+              <a:rPr lang="en-US" baseline="0" dirty="0" smtClean="0"/>
+              <a:t>Talk about the following points here:</a:t>
+            </a:r>
+          </a:p>
+          <a:p>
+            <a:r>
+              <a:rPr lang="en-US" baseline="0" dirty="0" smtClean="0"/>
+              <a:t>how are the results </a:t>
+            </a:r>
+            <a:r>
+              <a:rPr lang="en-US" baseline="0" dirty="0" err="1" smtClean="0"/>
+              <a:t>gonna</a:t>
+            </a:r>
+            <a:r>
+              <a:rPr lang="en-US" baseline="0" dirty="0" smtClean="0"/>
+              <a:t> be used</a:t>
+            </a:r>
+          </a:p>
+          <a:p>
+            <a:endParaRPr lang="en-US" baseline="0" dirty="0" smtClean="0"/>
+          </a:p>
+          <a:p>
+            <a:r>
+              <a:rPr lang="en-US" baseline="0" dirty="0" smtClean="0"/>
+              <a:t>becoming more popular</a:t>
+            </a:r>
+          </a:p>
+          <a:p>
+            <a:endParaRPr lang="en-US" baseline="0" dirty="0" smtClean="0"/>
+          </a:p>
+          <a:p>
+            <a:r>
+              <a:rPr lang="en-US" baseline="0" dirty="0" smtClean="0"/>
+              <a:t>after the application has been released</a:t>
+            </a:r>
+          </a:p>
+          <a:p>
+            <a:endParaRPr lang="en-US" baseline="0" dirty="0" smtClean="0"/>
+          </a:p>
+          <a:p>
+            <a:r>
+              <a:rPr lang="en-US" baseline="0" dirty="0" smtClean="0"/>
+              <a:t>can we understand developer's misconceptions</a:t>
+            </a:r>
+          </a:p>
+          <a:p>
             <a:endParaRPr lang="en-US" dirty="0"/>
           </a:p>
         </p:txBody>
@@ -4479,7 +4572,7 @@
           <a:p>
             <a:fld id="{3CFCBF25-E5F4-8D4E-B113-BA53DF871735}" type="slidenum">
               <a:rPr lang="en-US" smtClean="0"/>
-              <a:t>7</a:t>
+              <a:t>5</a:t>
             </a:fld>
             <a:endParaRPr lang="en-US"/>
           </a:p>
@@ -4488,7 +4581,7 @@
     </p:spTree>
     <p:extLst>
       <p:ext uri="{BB962C8B-B14F-4D97-AF65-F5344CB8AC3E}">
-        <p14:creationId xmlns:p14="http://schemas.microsoft.com/office/powerpoint/2010/main" val="3992274241"/>
+        <p14:creationId xmlns:p14="http://schemas.microsoft.com/office/powerpoint/2010/main" val="2065749234"/>
       </p:ext>
     </p:extLst>
   </p:cSld>
@@ -4542,22 +4635,6 @@
           <a:bodyPr/>
           <a:lstStyle/>
           <a:p>
-            <a:r>
-              <a:rPr lang="en-US" dirty="0" smtClean="0"/>
-              <a:t>developers are aware of</a:t>
-            </a:r>
-            <a:r>
-              <a:rPr lang="en-US" baseline="0" dirty="0" smtClean="0"/>
-              <a:t> the target platform they are developing the application, therefor high level tagging is correct</a:t>
-            </a:r>
-          </a:p>
-          <a:p>
-            <a:endParaRPr lang="en-US" baseline="0" dirty="0" smtClean="0"/>
-          </a:p>
-          <a:p>
-            <a:endParaRPr lang="en-US" dirty="0" smtClean="0"/>
-          </a:p>
-          <a:p>
             <a:endParaRPr lang="en-US" dirty="0"/>
           </a:p>
         </p:txBody>
@@ -4579,7 +4656,7 @@
           <a:p>
             <a:fld id="{3CFCBF25-E5F4-8D4E-B113-BA53DF871735}" type="slidenum">
               <a:rPr lang="en-US" smtClean="0"/>
-              <a:t>9</a:t>
+              <a:t>8</a:t>
             </a:fld>
             <a:endParaRPr lang="en-US"/>
           </a:p>
@@ -4588,7 +4665,7 @@
     </p:spTree>
     <p:extLst>
       <p:ext uri="{BB962C8B-B14F-4D97-AF65-F5344CB8AC3E}">
-        <p14:creationId xmlns:p14="http://schemas.microsoft.com/office/powerpoint/2010/main" val="305563513"/>
+        <p14:creationId xmlns:p14="http://schemas.microsoft.com/office/powerpoint/2010/main" val="3992274241"/>
       </p:ext>
     </p:extLst>
   </p:cSld>
@@ -4642,28 +4719,23 @@
           <a:bodyPr/>
           <a:lstStyle/>
           <a:p>
+            <a:r>
+              <a:rPr lang="en-US" dirty="0" smtClean="0"/>
+              <a:t>developers are aware of</a:t>
+            </a:r>
+            <a:r>
+              <a:rPr lang="en-US" baseline="0" dirty="0" smtClean="0"/>
+              <a:t> the target platform they are developing the application, therefor high level tagging is correct</a:t>
+            </a:r>
+          </a:p>
+          <a:p>
+            <a:endParaRPr lang="en-US" baseline="0" dirty="0" smtClean="0"/>
+          </a:p>
+          <a:p>
+            <a:endParaRPr lang="en-US" dirty="0" smtClean="0"/>
+          </a:p>
+          <a:p>
             <a:endParaRPr lang="en-US" dirty="0"/>
-          </a:p>
-          <a:p>
-            <a:r>
-              <a:rPr lang="en-US" dirty="0"/>
-              <a:t>----- Meeting Notes (2014-05-16 15:23) -----</a:t>
-            </a:r>
-          </a:p>
-          <a:p>
-            <a:r>
-              <a:rPr lang="en-US" dirty="0"/>
-              <a:t>add over all methodology here</a:t>
-            </a:r>
-          </a:p>
-          <a:p>
-            <a:endParaRPr lang="en-US" dirty="0"/>
-          </a:p>
-          <a:p>
-            <a:r>
-              <a:rPr lang="en-US" dirty="0"/>
-              <a:t>skip everything</a:t>
-            </a:r>
           </a:p>
         </p:txBody>
       </p:sp>
@@ -4684,7 +4756,7 @@
           <a:p>
             <a:fld id="{3CFCBF25-E5F4-8D4E-B113-BA53DF871735}" type="slidenum">
               <a:rPr lang="en-US" smtClean="0"/>
-              <a:t>11</a:t>
+              <a:t>10</a:t>
             </a:fld>
             <a:endParaRPr lang="en-US"/>
           </a:p>
@@ -4693,7 +4765,7 @@
     </p:spTree>
     <p:extLst>
       <p:ext uri="{BB962C8B-B14F-4D97-AF65-F5344CB8AC3E}">
-        <p14:creationId xmlns:p14="http://schemas.microsoft.com/office/powerpoint/2010/main" val="4259735866"/>
+        <p14:creationId xmlns:p14="http://schemas.microsoft.com/office/powerpoint/2010/main" val="305563513"/>
       </p:ext>
     </p:extLst>
   </p:cSld>
@@ -4747,15 +4819,28 @@
           <a:bodyPr/>
           <a:lstStyle/>
           <a:p>
-            <a:r>
-              <a:rPr lang="en-US" dirty="0" smtClean="0"/>
-              <a:t>In total there are more than 500 thousand questions available</a:t>
-            </a:r>
-            <a:r>
-              <a:rPr lang="en-US" baseline="0" dirty="0" smtClean="0"/>
-              <a:t> on stack overflow pertaining to web applications</a:t>
-            </a:r>
             <a:endParaRPr lang="en-US" dirty="0"/>
+          </a:p>
+          <a:p>
+            <a:r>
+              <a:rPr lang="en-US" dirty="0"/>
+              <a:t>----- Meeting Notes (2014-05-16 15:23) -----</a:t>
+            </a:r>
+          </a:p>
+          <a:p>
+            <a:r>
+              <a:rPr lang="en-US" dirty="0"/>
+              <a:t>add over all methodology here</a:t>
+            </a:r>
+          </a:p>
+          <a:p>
+            <a:endParaRPr lang="en-US" dirty="0"/>
+          </a:p>
+          <a:p>
+            <a:r>
+              <a:rPr lang="en-US" dirty="0"/>
+              <a:t>skip everything</a:t>
+            </a:r>
           </a:p>
         </p:txBody>
       </p:sp>
@@ -4785,7 +4870,7 @@
     </p:spTree>
     <p:extLst>
       <p:ext uri="{BB962C8B-B14F-4D97-AF65-F5344CB8AC3E}">
-        <p14:creationId xmlns:p14="http://schemas.microsoft.com/office/powerpoint/2010/main" val="1412145102"/>
+        <p14:creationId xmlns:p14="http://schemas.microsoft.com/office/powerpoint/2010/main" val="4259735866"/>
       </p:ext>
     </p:extLst>
   </p:cSld>
@@ -13405,7 +13490,7 @@
           <a:p>
             <a:r>
               <a:rPr lang="en-US" dirty="0" smtClean="0"/>
-              <a:t>Tags</a:t>
+              <a:t>Straw man Approach</a:t>
             </a:r>
             <a:endParaRPr lang="en-US" dirty="0"/>
           </a:p>
@@ -13429,51 +13514,75 @@
           <a:lstStyle/>
           <a:p>
             <a:r>
+              <a:rPr lang="en-US" sz="2400" dirty="0" smtClean="0">
+                <a:solidFill>
+                  <a:srgbClr val="D9D9D9"/>
+                </a:solidFill>
+              </a:rPr>
+              <a:t>Categorization based on tags attached to each question</a:t>
+            </a:r>
+          </a:p>
+          <a:p>
+            <a:r>
+              <a:rPr lang="en-US" sz="2400" dirty="0" smtClean="0">
+                <a:solidFill>
+                  <a:srgbClr val="D9D9D9"/>
+                </a:solidFill>
+              </a:rPr>
+              <a:t>Can provide an overview of major topics of discussion</a:t>
+            </a:r>
+            <a:endParaRPr lang="en-US" sz="2400" dirty="0">
+              <a:solidFill>
+                <a:srgbClr val="D9D9D9"/>
+              </a:solidFill>
+            </a:endParaRPr>
+          </a:p>
+          <a:p>
+            <a:endParaRPr lang="en-US" sz="2400" dirty="0"/>
+          </a:p>
+        </p:txBody>
+      </p:sp>
+      <p:sp>
+        <p:nvSpPr>
+          <p:cNvPr id="5" name="Rectangle 4"/>
+          <p:cNvSpPr/>
+          <p:nvPr/>
+        </p:nvSpPr>
+        <p:spPr>
+          <a:xfrm>
+            <a:off x="612588" y="4766234"/>
+            <a:ext cx="7993530" cy="1673412"/>
+          </a:xfrm>
+          <a:prstGeom prst="rect">
+            <a:avLst/>
+          </a:prstGeom>
+        </p:spPr>
+        <p:style>
+          <a:lnRef idx="2">
+            <a:schemeClr val="accent1">
+              <a:shade val="50000"/>
+            </a:schemeClr>
+          </a:lnRef>
+          <a:fillRef idx="1">
+            <a:schemeClr val="accent1"/>
+          </a:fillRef>
+          <a:effectRef idx="0">
+            <a:schemeClr val="accent1"/>
+          </a:effectRef>
+          <a:fontRef idx="minor">
+            <a:schemeClr val="lt1"/>
+          </a:fontRef>
+        </p:style>
+        <p:txBody>
+          <a:bodyPr rtlCol="0" anchor="ctr"/>
+          <a:lstStyle/>
+          <a:p>
+            <a:pPr algn="ctr"/>
+            <a:r>
               <a:rPr lang="en-US" sz="2400" dirty="0" smtClean="0"/>
-              <a:t>What is known to developer while tagging?</a:t>
-            </a:r>
-          </a:p>
-          <a:p>
-            <a:pPr lvl="1"/>
-            <a:r>
-              <a:rPr lang="en-US" sz="2000" dirty="0" smtClean="0"/>
-              <a:t>Platform</a:t>
-            </a:r>
-          </a:p>
-          <a:p>
-            <a:pPr lvl="1"/>
-            <a:r>
-              <a:rPr lang="en-US" sz="2000" dirty="0" smtClean="0"/>
-              <a:t>Target Device</a:t>
-            </a:r>
-          </a:p>
-          <a:p>
-            <a:pPr lvl="1"/>
-            <a:endParaRPr lang="en-US" sz="2000" dirty="0"/>
-          </a:p>
-          <a:p>
-            <a:r>
-              <a:rPr lang="en-US" sz="2400" dirty="0" smtClean="0"/>
-              <a:t>What is unknown to developer?</a:t>
-            </a:r>
-          </a:p>
-          <a:p>
-            <a:pPr lvl="1"/>
-            <a:r>
-              <a:rPr lang="en-US" sz="2000" dirty="0" smtClean="0"/>
-              <a:t>Possible ways to solve the problem</a:t>
-            </a:r>
-          </a:p>
-          <a:p>
-            <a:pPr lvl="1"/>
-            <a:r>
-              <a:rPr lang="en-US" sz="2000" dirty="0" smtClean="0"/>
-              <a:t>Correct topic of discussion </a:t>
-            </a:r>
-          </a:p>
-          <a:p>
-            <a:pPr lvl="1"/>
-            <a:endParaRPr lang="en-US" sz="2000" dirty="0"/>
+              <a:t>How appropriate are tags?</a:t>
+            </a:r>
+            <a:endParaRPr lang="en-US" sz="2400" dirty="0"/>
           </a:p>
         </p:txBody>
       </p:sp>
@@ -13518,6 +13627,178 @@
             <a:fld id="{5FD889E0-CAB2-4699-909D-B9A88D47ACBE}" type="slidenum">
               <a:rPr lang="en-US" smtClean="0"/>
               <a:t>9</a:t>
+            </a:fld>
+            <a:endParaRPr lang="en-US"/>
+          </a:p>
+        </p:txBody>
+      </p:sp>
+    </p:spTree>
+    <p:extLst>
+      <p:ext uri="{BB962C8B-B14F-4D97-AF65-F5344CB8AC3E}">
+        <p14:creationId xmlns:p14="http://schemas.microsoft.com/office/powerpoint/2010/main" val="822971014"/>
+      </p:ext>
+    </p:extLst>
+  </p:cSld>
+  <p:clrMapOvr>
+    <a:masterClrMapping/>
+  </p:clrMapOvr>
+  <p:timing>
+    <p:tnLst>
+      <p:par>
+        <p:cTn xmlns:p14="http://schemas.microsoft.com/office/powerpoint/2010/main" id="1" dur="indefinite" restart="never" nodeType="tmRoot"/>
+      </p:par>
+    </p:tnLst>
+  </p:timing>
+</p:sld>
+</file>
+
+<file path=ppt/slides/slide11.xml><?xml version="1.0" encoding="utf-8"?>
+<p:sld xmlns:a="http://schemas.openxmlformats.org/drawingml/2006/main" xmlns:r="http://schemas.openxmlformats.org/officeDocument/2006/relationships" xmlns:p="http://schemas.openxmlformats.org/presentationml/2006/main">
+  <p:cSld>
+    <p:spTree>
+      <p:nvGrpSpPr>
+        <p:cNvPr id="1" name=""/>
+        <p:cNvGrpSpPr/>
+        <p:nvPr/>
+      </p:nvGrpSpPr>
+      <p:grpSpPr>
+        <a:xfrm>
+          <a:off x="0" y="0"/>
+          <a:ext cx="0" cy="0"/>
+          <a:chOff x="0" y="0"/>
+          <a:chExt cx="0" cy="0"/>
+        </a:xfrm>
+      </p:grpSpPr>
+      <p:sp>
+        <p:nvSpPr>
+          <p:cNvPr id="2" name="Title 1"/>
+          <p:cNvSpPr>
+            <a:spLocks noGrp="1"/>
+          </p:cNvSpPr>
+          <p:nvPr>
+            <p:ph type="title"/>
+          </p:nvPr>
+        </p:nvSpPr>
+        <p:spPr/>
+        <p:txBody>
+          <a:bodyPr/>
+          <a:lstStyle/>
+          <a:p>
+            <a:r>
+              <a:rPr lang="en-US" dirty="0" smtClean="0"/>
+              <a:t>Tags</a:t>
+            </a:r>
+            <a:endParaRPr lang="en-US" dirty="0"/>
+          </a:p>
+        </p:txBody>
+      </p:sp>
+      <p:sp>
+        <p:nvSpPr>
+          <p:cNvPr id="3" name="Content Placeholder 2"/>
+          <p:cNvSpPr>
+            <a:spLocks noGrp="1"/>
+          </p:cNvSpPr>
+          <p:nvPr>
+            <p:ph idx="1"/>
+          </p:nvPr>
+        </p:nvSpPr>
+        <p:spPr/>
+        <p:txBody>
+          <a:bodyPr>
+            <a:normAutofit/>
+          </a:bodyPr>
+          <a:lstStyle/>
+          <a:p>
+            <a:r>
+              <a:rPr lang="en-US" sz="2400" dirty="0" smtClean="0"/>
+              <a:t>What is known to developer while tagging?</a:t>
+            </a:r>
+          </a:p>
+          <a:p>
+            <a:pPr lvl="1"/>
+            <a:r>
+              <a:rPr lang="en-US" sz="2000" dirty="0" smtClean="0"/>
+              <a:t>Platform</a:t>
+            </a:r>
+          </a:p>
+          <a:p>
+            <a:pPr lvl="1"/>
+            <a:r>
+              <a:rPr lang="en-US" sz="2000" dirty="0" smtClean="0"/>
+              <a:t>Target Device</a:t>
+            </a:r>
+          </a:p>
+          <a:p>
+            <a:pPr lvl="1"/>
+            <a:endParaRPr lang="en-US" sz="2000" dirty="0"/>
+          </a:p>
+          <a:p>
+            <a:r>
+              <a:rPr lang="en-US" sz="2400" dirty="0" smtClean="0"/>
+              <a:t>What is unknown to developer?</a:t>
+            </a:r>
+          </a:p>
+          <a:p>
+            <a:pPr lvl="1"/>
+            <a:r>
+              <a:rPr lang="en-US" sz="2000" dirty="0" smtClean="0"/>
+              <a:t>Possible ways to solve the problem</a:t>
+            </a:r>
+          </a:p>
+          <a:p>
+            <a:pPr lvl="1"/>
+            <a:r>
+              <a:rPr lang="en-US" sz="2000" dirty="0" smtClean="0"/>
+              <a:t>Correct topic of discussion </a:t>
+            </a:r>
+          </a:p>
+          <a:p>
+            <a:pPr lvl="1"/>
+            <a:endParaRPr lang="en-US" sz="2000" dirty="0"/>
+          </a:p>
+        </p:txBody>
+      </p:sp>
+      <p:sp>
+        <p:nvSpPr>
+          <p:cNvPr id="7" name="Footer Placeholder 6"/>
+          <p:cNvSpPr>
+            <a:spLocks noGrp="1"/>
+          </p:cNvSpPr>
+          <p:nvPr>
+            <p:ph type="ftr" sz="quarter" idx="11"/>
+          </p:nvPr>
+        </p:nvSpPr>
+        <p:spPr/>
+        <p:txBody>
+          <a:bodyPr/>
+          <a:lstStyle/>
+          <a:p>
+            <a:r>
+              <a:rPr lang="sk-SK" smtClean="0"/>
+              <a:t>MSR 2014</a:t>
+            </a:r>
+            <a:endParaRPr lang="en-US"/>
+          </a:p>
+        </p:txBody>
+      </p:sp>
+      <p:sp>
+        <p:nvSpPr>
+          <p:cNvPr id="8" name="Slide Number Placeholder 7"/>
+          <p:cNvSpPr>
+            <a:spLocks noGrp="1"/>
+          </p:cNvSpPr>
+          <p:nvPr>
+            <p:ph type="sldNum" sz="quarter" idx="12"/>
+          </p:nvPr>
+        </p:nvSpPr>
+        <p:spPr/>
+        <p:txBody>
+          <a:bodyPr/>
+          <a:lstStyle/>
+          <a:p>
+            <a:fld id="{5FD889E0-CAB2-4699-909D-B9A88D47ACBE}" type="slidenum">
+              <a:rPr lang="en-US" smtClean="0"/>
+              <a:t>10</a:t>
             </a:fld>
             <a:endParaRPr lang="en-US"/>
           </a:p>
@@ -13860,7 +14141,7 @@
 </p:sld>
 </file>
 
-<file path=ppt/slides/slide11.xml><?xml version="1.0" encoding="utf-8"?>
+<file path=ppt/slides/slide12.xml><?xml version="1.0" encoding="utf-8"?>
 <p:sld xmlns:a="http://schemas.openxmlformats.org/drawingml/2006/main" xmlns:r="http://schemas.openxmlformats.org/officeDocument/2006/relationships" xmlns:p="http://schemas.openxmlformats.org/presentationml/2006/main">
   <p:cSld>
     <p:spTree>
@@ -13941,7 +14222,7 @@
             <a:fld id="{5FD889E0-CAB2-4699-909D-B9A88D47ACBE}" type="slidenum">
               <a:rPr lang="en-US" smtClean="0"/>
               <a:pPr/>
-              <a:t>10</a:t>
+              <a:t>11</a:t>
             </a:fld>
             <a:endParaRPr lang="en-US" dirty="0"/>
           </a:p>
@@ -14121,7 +14402,7 @@
 </p:sld>
 </file>
 
-<file path=ppt/slides/slide12.xml><?xml version="1.0" encoding="utf-8"?>
+<file path=ppt/slides/slide13.xml><?xml version="1.0" encoding="utf-8"?>
 <p:sld xmlns:a="http://schemas.openxmlformats.org/drawingml/2006/main" xmlns:r="http://schemas.openxmlformats.org/officeDocument/2006/relationships" xmlns:p="http://schemas.openxmlformats.org/presentationml/2006/main">
   <p:cSld>
     <p:spTree>
@@ -14226,7 +14507,7 @@
           <a:p>
             <a:fld id="{5FD889E0-CAB2-4699-909D-B9A88D47ACBE}" type="slidenum">
               <a:rPr lang="en-US" smtClean="0"/>
-              <a:t>11</a:t>
+              <a:t>12</a:t>
             </a:fld>
             <a:endParaRPr lang="en-US"/>
           </a:p>
@@ -14548,7 +14829,7 @@
 </p:sld>
 </file>
 
-<file path=ppt/slides/slide13.xml><?xml version="1.0" encoding="utf-8"?>
+<file path=ppt/slides/slide14.xml><?xml version="1.0" encoding="utf-8"?>
 <p:sld xmlns:a="http://schemas.openxmlformats.org/drawingml/2006/main" xmlns:r="http://schemas.openxmlformats.org/officeDocument/2006/relationships" xmlns:p="http://schemas.openxmlformats.org/presentationml/2006/main">
   <p:cSld>
     <p:spTree>
@@ -14628,7 +14909,7 @@
           <a:p>
             <a:fld id="{5FD889E0-CAB2-4699-909D-B9A88D47ACBE}" type="slidenum">
               <a:rPr lang="en-US" smtClean="0"/>
-              <a:t>12</a:t>
+              <a:t>13</a:t>
             </a:fld>
             <a:endParaRPr lang="en-US"/>
           </a:p>
@@ -14683,7 +14964,7 @@
 </p:sld>
 </file>
 
-<file path=ppt/slides/slide14.xml><?xml version="1.0" encoding="utf-8"?>
+<file path=ppt/slides/slide15.xml><?xml version="1.0" encoding="utf-8"?>
 <p:sld xmlns:a="http://schemas.openxmlformats.org/drawingml/2006/main" xmlns:r="http://schemas.openxmlformats.org/officeDocument/2006/relationships" xmlns:p="http://schemas.openxmlformats.org/presentationml/2006/main">
   <p:cSld>
     <p:spTree>
@@ -14796,7 +15077,7 @@
           <a:p>
             <a:fld id="{5FD889E0-CAB2-4699-909D-B9A88D47ACBE}" type="slidenum">
               <a:rPr lang="en-US" smtClean="0"/>
-              <a:t>13</a:t>
+              <a:t>14</a:t>
             </a:fld>
             <a:endParaRPr lang="en-US"/>
           </a:p>
@@ -14822,7 +15103,7 @@
 </p:sld>
 </file>
 
-<file path=ppt/slides/slide15.xml><?xml version="1.0" encoding="utf-8"?>
+<file path=ppt/slides/slide16.xml><?xml version="1.0" encoding="utf-8"?>
 <p:sld xmlns:a="http://schemas.openxmlformats.org/drawingml/2006/main" xmlns:r="http://schemas.openxmlformats.org/officeDocument/2006/relationships" xmlns:p="http://schemas.openxmlformats.org/presentationml/2006/main">
   <p:cSld>
     <p:spTree>
@@ -14976,7 +15257,7 @@
           <a:p>
             <a:fld id="{5FD889E0-CAB2-4699-909D-B9A88D47ACBE}" type="slidenum">
               <a:rPr lang="en-US" smtClean="0"/>
-              <a:t>14</a:t>
+              <a:t>15</a:t>
             </a:fld>
             <a:endParaRPr lang="en-US"/>
           </a:p>
@@ -15002,7 +15283,7 @@
 </p:sld>
 </file>
 
-<file path=ppt/slides/slide16.xml><?xml version="1.0" encoding="utf-8"?>
+<file path=ppt/slides/slide17.xml><?xml version="1.0" encoding="utf-8"?>
 <p:sld xmlns:a="http://schemas.openxmlformats.org/drawingml/2006/main" xmlns:r="http://schemas.openxmlformats.org/officeDocument/2006/relationships" xmlns:p="http://schemas.openxmlformats.org/presentationml/2006/main">
   <p:cSld>
     <p:spTree>
@@ -15282,7 +15563,7 @@
           <a:p>
             <a:fld id="{5FD889E0-CAB2-4699-909D-B9A88D47ACBE}" type="slidenum">
               <a:rPr lang="en-US" smtClean="0"/>
-              <a:t>15</a:t>
+              <a:t>16</a:t>
             </a:fld>
             <a:endParaRPr lang="en-US"/>
           </a:p>
@@ -15308,7 +15589,7 @@
 </p:sld>
 </file>
 
-<file path=ppt/slides/slide17.xml><?xml version="1.0" encoding="utf-8"?>
+<file path=ppt/slides/slide18.xml><?xml version="1.0" encoding="utf-8"?>
 <p:sld xmlns:a="http://schemas.openxmlformats.org/drawingml/2006/main" xmlns:r="http://schemas.openxmlformats.org/officeDocument/2006/relationships" xmlns:p="http://schemas.openxmlformats.org/presentationml/2006/main">
   <p:cSld>
     <p:spTree>
@@ -15868,7 +16149,7 @@
           <a:p>
             <a:fld id="{5FD889E0-CAB2-4699-909D-B9A88D47ACBE}" type="slidenum">
               <a:rPr lang="en-US" smtClean="0"/>
-              <a:t>16</a:t>
+              <a:t>17</a:t>
             </a:fld>
             <a:endParaRPr lang="en-US"/>
           </a:p>
@@ -15878,136 +16159,6 @@
     <p:extLst>
       <p:ext uri="{BB962C8B-B14F-4D97-AF65-F5344CB8AC3E}">
         <p14:creationId xmlns:p14="http://schemas.microsoft.com/office/powerpoint/2010/main" val="3471795558"/>
-      </p:ext>
-    </p:extLst>
-  </p:cSld>
-  <p:clrMapOvr>
-    <a:masterClrMapping/>
-  </p:clrMapOvr>
-  <p:timing>
-    <p:tnLst>
-      <p:par>
-        <p:cTn xmlns:p14="http://schemas.microsoft.com/office/powerpoint/2010/main" id="1" dur="indefinite" restart="never" nodeType="tmRoot"/>
-      </p:par>
-    </p:tnLst>
-  </p:timing>
-</p:sld>
-</file>
-
-<file path=ppt/slides/slide18.xml><?xml version="1.0" encoding="utf-8"?>
-<p:sld xmlns:a="http://schemas.openxmlformats.org/drawingml/2006/main" xmlns:r="http://schemas.openxmlformats.org/officeDocument/2006/relationships" xmlns:p="http://schemas.openxmlformats.org/presentationml/2006/main">
-  <p:cSld>
-    <p:spTree>
-      <p:nvGrpSpPr>
-        <p:cNvPr id="1" name=""/>
-        <p:cNvGrpSpPr/>
-        <p:nvPr/>
-      </p:nvGrpSpPr>
-      <p:grpSpPr>
-        <a:xfrm>
-          <a:off x="0" y="0"/>
-          <a:ext cx="0" cy="0"/>
-          <a:chOff x="0" y="0"/>
-          <a:chExt cx="0" cy="0"/>
-        </a:xfrm>
-      </p:grpSpPr>
-      <p:sp>
-        <p:nvSpPr>
-          <p:cNvPr id="2" name="Title 1"/>
-          <p:cNvSpPr>
-            <a:spLocks noGrp="1"/>
-          </p:cNvSpPr>
-          <p:nvPr>
-            <p:ph type="title"/>
-          </p:nvPr>
-        </p:nvSpPr>
-        <p:spPr/>
-        <p:txBody>
-          <a:bodyPr/>
-          <a:lstStyle/>
-          <a:p>
-            <a:r>
-              <a:rPr lang="en-US" dirty="0"/>
-              <a:t>RQ3: Temporal trends over time</a:t>
-            </a:r>
-          </a:p>
-        </p:txBody>
-      </p:sp>
-      <p:pic>
-        <p:nvPicPr>
-          <p:cNvPr id="5" name="Content Placeholder 4" descr="JavaScriptTrend.pdf"/>
-          <p:cNvPicPr>
-            <a:picLocks noGrp="1" noChangeAspect="1"/>
-          </p:cNvPicPr>
-          <p:nvPr>
-            <p:ph idx="1"/>
-          </p:nvPr>
-        </p:nvPicPr>
-        <p:blipFill>
-          <a:blip r:embed="rId3">
-            <a:extLst>
-              <a:ext uri="{28A0092B-C50C-407E-A947-70E740481C1C}">
-                <a14:useLocalDpi xmlns:a14="http://schemas.microsoft.com/office/drawing/2010/main" val="0"/>
-              </a:ext>
-            </a:extLst>
-          </a:blip>
-          <a:srcRect l="-8607" r="-8607"/>
-          <a:stretch>
-            <a:fillRect/>
-          </a:stretch>
-        </p:blipFill>
-        <p:spPr/>
-      </p:pic>
-      <p:sp>
-        <p:nvSpPr>
-          <p:cNvPr id="6" name="Footer Placeholder 5"/>
-          <p:cNvSpPr>
-            <a:spLocks noGrp="1"/>
-          </p:cNvSpPr>
-          <p:nvPr>
-            <p:ph type="ftr" sz="quarter" idx="11"/>
-          </p:nvPr>
-        </p:nvSpPr>
-        <p:spPr/>
-        <p:txBody>
-          <a:bodyPr/>
-          <a:lstStyle/>
-          <a:p>
-            <a:r>
-              <a:rPr lang="sk-SK" smtClean="0"/>
-              <a:t>MSR 2014</a:t>
-            </a:r>
-            <a:endParaRPr lang="en-US"/>
-          </a:p>
-        </p:txBody>
-      </p:sp>
-      <p:sp>
-        <p:nvSpPr>
-          <p:cNvPr id="7" name="Slide Number Placeholder 6"/>
-          <p:cNvSpPr>
-            <a:spLocks noGrp="1"/>
-          </p:cNvSpPr>
-          <p:nvPr>
-            <p:ph type="sldNum" sz="quarter" idx="12"/>
-          </p:nvPr>
-        </p:nvSpPr>
-        <p:spPr/>
-        <p:txBody>
-          <a:bodyPr/>
-          <a:lstStyle/>
-          <a:p>
-            <a:fld id="{5FD889E0-CAB2-4699-909D-B9A88D47ACBE}" type="slidenum">
-              <a:rPr lang="en-US" smtClean="0"/>
-              <a:t>17</a:t>
-            </a:fld>
-            <a:endParaRPr lang="en-US"/>
-          </a:p>
-        </p:txBody>
-      </p:sp>
-    </p:spTree>
-    <p:extLst>
-      <p:ext uri="{BB962C8B-B14F-4D97-AF65-F5344CB8AC3E}">
-        <p14:creationId xmlns:p14="http://schemas.microsoft.com/office/powerpoint/2010/main" val="1724094845"/>
       </p:ext>
     </p:extLst>
   </p:cSld>
@@ -16074,8 +16225,7 @@
           </p:nvPr>
         </p:nvPicPr>
         <p:blipFill>
-          <a:blip r:embed="rId2">
-            <a:alphaModFix amt="41000"/>
+          <a:blip r:embed="rId3">
             <a:extLst>
               <a:ext uri="{28A0092B-C50C-407E-A947-70E740481C1C}">
                 <a14:useLocalDpi xmlns:a14="http://schemas.microsoft.com/office/drawing/2010/main" val="0"/>
@@ -16091,71 +16241,7 @@
       </p:pic>
       <p:sp>
         <p:nvSpPr>
-          <p:cNvPr id="6" name="Rectangle 5"/>
-          <p:cNvSpPr/>
-          <p:nvPr/>
-        </p:nvSpPr>
-        <p:spPr>
-          <a:xfrm>
-            <a:off x="612588" y="2659655"/>
-            <a:ext cx="7993530" cy="1673412"/>
-          </a:xfrm>
-          <a:prstGeom prst="rect">
-            <a:avLst/>
-          </a:prstGeom>
-        </p:spPr>
-        <p:style>
-          <a:lnRef idx="2">
-            <a:schemeClr val="accent3">
-              <a:shade val="50000"/>
-            </a:schemeClr>
-          </a:lnRef>
-          <a:fillRef idx="1">
-            <a:schemeClr val="accent3"/>
-          </a:fillRef>
-          <a:effectRef idx="0">
-            <a:schemeClr val="accent3"/>
-          </a:effectRef>
-          <a:fontRef idx="minor">
-            <a:schemeClr val="lt1"/>
-          </a:fontRef>
-        </p:style>
-        <p:txBody>
-          <a:bodyPr rtlCol="0" anchor="ctr"/>
-          <a:lstStyle/>
-          <a:p>
-            <a:pPr algn="ctr"/>
-            <a:r>
-              <a:rPr lang="en-US" sz="2400" dirty="0"/>
-              <a:t>Cross-browser compatibility issues have seen a sharp decline in the recent past. </a:t>
-            </a:r>
-            <a:endParaRPr lang="en-US" sz="2400" dirty="0" smtClean="0"/>
-          </a:p>
-          <a:p>
-            <a:pPr algn="ctr"/>
-            <a:endParaRPr lang="en-US" sz="2400" dirty="0" smtClean="0"/>
-          </a:p>
-          <a:p>
-            <a:pPr algn="ctr"/>
-            <a:r>
-              <a:rPr lang="en-US" sz="2400" dirty="0" smtClean="0"/>
-              <a:t>Further</a:t>
-            </a:r>
-            <a:r>
-              <a:rPr lang="en-US" sz="2400" dirty="0"/>
-              <a:t>, CSS3 and HTML5 discussions are gaining </a:t>
-            </a:r>
-            <a:r>
-              <a:rPr lang="en-US" sz="2400" dirty="0" smtClean="0"/>
-              <a:t>popularity.</a:t>
-            </a:r>
-            <a:endParaRPr lang="en-US" sz="2400" dirty="0"/>
-          </a:p>
-        </p:txBody>
-      </p:sp>
-      <p:sp>
-        <p:nvSpPr>
-          <p:cNvPr id="7" name="Footer Placeholder 6"/>
+          <p:cNvPr id="6" name="Footer Placeholder 5"/>
           <p:cNvSpPr>
             <a:spLocks noGrp="1"/>
           </p:cNvSpPr>
@@ -16178,7 +16264,7 @@
       </p:sp>
       <p:sp>
         <p:nvSpPr>
-          <p:cNvPr id="8" name="Slide Number Placeholder 7"/>
+          <p:cNvPr id="7" name="Slide Number Placeholder 6"/>
           <p:cNvSpPr>
             <a:spLocks noGrp="1"/>
           </p:cNvSpPr>
@@ -16202,7 +16288,7 @@
     </p:spTree>
     <p:extLst>
       <p:ext uri="{BB962C8B-B14F-4D97-AF65-F5344CB8AC3E}">
-        <p14:creationId xmlns:p14="http://schemas.microsoft.com/office/powerpoint/2010/main" val="3188020155"/>
+        <p14:creationId xmlns:p14="http://schemas.microsoft.com/office/powerpoint/2010/main" val="1724094845"/>
       </p:ext>
     </p:extLst>
   </p:cSld>
@@ -16238,22 +16324,30 @@
       </p:grpSpPr>
       <p:sp>
         <p:nvSpPr>
-          <p:cNvPr id="7" name="Title 6"/>
-          <p:cNvSpPr>
-            <a:spLocks noGrp="1"/>
-          </p:cNvSpPr>
-          <p:nvPr>
-            <p:ph type="title"/>
-          </p:nvPr>
-        </p:nvSpPr>
-        <p:spPr/>
-        <p:txBody>
-          <a:bodyPr/>
-          <a:lstStyle/>
-          <a:p>
+          <p:cNvPr id="5" name="Title 4"/>
+          <p:cNvSpPr>
+            <a:spLocks noGrp="1"/>
+          </p:cNvSpPr>
+          <p:nvPr>
+            <p:ph type="ctrTitle"/>
+          </p:nvPr>
+        </p:nvSpPr>
+        <p:spPr>
+          <a:xfrm>
+            <a:off x="851864" y="4617571"/>
+            <a:ext cx="7558369" cy="933450"/>
+          </a:xfrm>
+        </p:spPr>
+        <p:txBody>
+          <a:bodyPr>
+            <a:normAutofit/>
+          </a:bodyPr>
+          <a:lstStyle/>
+          <a:p>
+            <a:pPr algn="ctr"/>
             <a:r>
               <a:rPr lang="en-US" dirty="0" smtClean="0"/>
-              <a:t>Problem Statement</a:t>
+              <a:t>Kartik Bajaj, Karthik Pattabiraman, Ali Mesbah</a:t>
             </a:r>
             <a:endParaRPr lang="en-US" dirty="0"/>
           </a:p>
@@ -16261,86 +16355,159 @@
       </p:sp>
       <p:sp>
         <p:nvSpPr>
-          <p:cNvPr id="8" name="Content Placeholder 7"/>
-          <p:cNvSpPr>
-            <a:spLocks noGrp="1"/>
-          </p:cNvSpPr>
-          <p:nvPr>
-            <p:ph idx="1"/>
-          </p:nvPr>
-        </p:nvSpPr>
-        <p:spPr/>
+          <p:cNvPr id="6" name="Subtitle 5"/>
+          <p:cNvSpPr>
+            <a:spLocks noGrp="1"/>
+          </p:cNvSpPr>
+          <p:nvPr>
+            <p:ph type="subTitle" idx="1"/>
+          </p:nvPr>
+        </p:nvSpPr>
+        <p:spPr>
+          <a:xfrm>
+            <a:off x="1309454" y="5259294"/>
+            <a:ext cx="6230626" cy="1449293"/>
+          </a:xfrm>
+        </p:spPr>
         <p:txBody>
           <a:bodyPr>
             <a:noAutofit/>
           </a:bodyPr>
           <a:lstStyle/>
           <a:p>
-            <a:r>
-              <a:rPr lang="en-US" sz="2400" dirty="0"/>
-              <a:t>Web applications are becoming popular over time</a:t>
-            </a:r>
-          </a:p>
-          <a:p>
-            <a:pPr lvl="1"/>
-            <a:r>
-              <a:rPr lang="en-US" sz="2200" dirty="0"/>
-              <a:t>[</a:t>
-            </a:r>
-            <a:r>
-              <a:rPr lang="en-US" sz="2200" dirty="0" err="1"/>
-              <a:t>Jazayeri</a:t>
-            </a:r>
-            <a:r>
-              <a:rPr lang="en-US" sz="2200" dirty="0"/>
-              <a:t> et al</a:t>
-            </a:r>
-            <a:r>
-              <a:rPr lang="en-US" sz="2200" dirty="0" smtClean="0"/>
-              <a:t>., </a:t>
-            </a:r>
-            <a:r>
-              <a:rPr lang="en-US" sz="2200" dirty="0"/>
-              <a:t>FOSE 2007</a:t>
-            </a:r>
-            <a:r>
-              <a:rPr lang="en-US" sz="2200" dirty="0" smtClean="0"/>
-              <a:t>]</a:t>
-            </a:r>
-          </a:p>
-          <a:p>
-            <a:pPr lvl="1"/>
-            <a:endParaRPr lang="en-US" sz="2200" dirty="0"/>
-          </a:p>
-          <a:p>
-            <a:r>
-              <a:rPr lang="en-US" sz="2400" dirty="0" smtClean="0"/>
-              <a:t>Complex integration of JavaScript, CSS, and HTML</a:t>
-            </a:r>
-            <a:endParaRPr lang="en-US" sz="2400" dirty="0"/>
-          </a:p>
-          <a:p>
-            <a:endParaRPr lang="en-US" sz="2400" dirty="0"/>
-          </a:p>
-          <a:p>
-            <a:r>
-              <a:rPr lang="en-US" sz="2400" dirty="0" smtClean="0"/>
-              <a:t>JavaScript code often experiences errors</a:t>
-            </a:r>
-          </a:p>
-          <a:p>
-            <a:pPr lvl="1"/>
-            <a:r>
-              <a:rPr lang="en-US" sz="2200" dirty="0" smtClean="0"/>
-              <a:t>[Ocariza et al., ISSRE 2011]</a:t>
-            </a:r>
-            <a:endParaRPr lang="en-US" sz="2200" dirty="0"/>
-          </a:p>
-        </p:txBody>
-      </p:sp>
-      <p:sp>
-        <p:nvSpPr>
-          <p:cNvPr id="3" name="Footer Placeholder 2"/>
+            <a:pPr algn="ctr"/>
+            <a:r>
+              <a:rPr lang="en-US" sz="1800" dirty="0" smtClean="0"/>
+              <a:t>Electrical and Computer Engineering</a:t>
+            </a:r>
+          </a:p>
+          <a:p>
+            <a:pPr algn="ctr"/>
+            <a:r>
+              <a:rPr lang="en-US" sz="1800" dirty="0" smtClean="0"/>
+              <a:t>University of British Columbia</a:t>
+            </a:r>
+          </a:p>
+          <a:p>
+            <a:pPr algn="ctr"/>
+            <a:r>
+              <a:rPr lang="en-US" sz="1800" dirty="0" smtClean="0"/>
+              <a:t>Vancouver, BC, Canada</a:t>
+            </a:r>
+          </a:p>
+          <a:p>
+            <a:pPr algn="ctr"/>
+            <a:r>
+              <a:rPr lang="en-US" sz="1800" dirty="0" smtClean="0"/>
+              <a:t>{</a:t>
+            </a:r>
+            <a:r>
+              <a:rPr lang="en-US" sz="1800" dirty="0" err="1" smtClean="0"/>
+              <a:t>kbajaj</a:t>
+            </a:r>
+            <a:r>
+              <a:rPr lang="en-US" sz="1800" dirty="0" smtClean="0"/>
+              <a:t>, </a:t>
+            </a:r>
+            <a:r>
+              <a:rPr lang="en-US" sz="1800" dirty="0" err="1" smtClean="0"/>
+              <a:t>karthikp</a:t>
+            </a:r>
+            <a:r>
+              <a:rPr lang="en-US" sz="1800" dirty="0" smtClean="0"/>
+              <a:t>, </a:t>
+            </a:r>
+            <a:r>
+              <a:rPr lang="en-US" sz="1800" dirty="0" err="1" smtClean="0"/>
+              <a:t>amesbah</a:t>
+            </a:r>
+            <a:r>
+              <a:rPr lang="en-US" sz="1800" dirty="0" smtClean="0"/>
+              <a:t>}@</a:t>
+            </a:r>
+            <a:r>
+              <a:rPr lang="en-US" sz="1800" dirty="0" err="1" smtClean="0"/>
+              <a:t>ece.ubc.ca</a:t>
+            </a:r>
+            <a:endParaRPr lang="en-US" sz="1800" dirty="0"/>
+          </a:p>
+        </p:txBody>
+      </p:sp>
+      <p:pic>
+        <p:nvPicPr>
+          <p:cNvPr id="11" name="Picture Placeholder 10"/>
+          <p:cNvPicPr>
+            <a:picLocks noGrp="1" noChangeAspect="1"/>
+          </p:cNvPicPr>
+          <p:nvPr>
+            <p:ph type="pic" sz="quarter" idx="12"/>
+          </p:nvPr>
+        </p:nvPicPr>
+        <p:blipFill>
+          <a:blip r:embed="rId3"/>
+          <a:srcRect t="463" b="463"/>
+          <a:stretch>
+            <a:fillRect/>
+          </a:stretch>
+        </p:blipFill>
+        <p:spPr/>
+      </p:pic>
+      <p:pic>
+        <p:nvPicPr>
+          <p:cNvPr id="12" name="Picture Placeholder 11"/>
+          <p:cNvPicPr>
+            <a:picLocks noGrp="1" noChangeAspect="1"/>
+          </p:cNvPicPr>
+          <p:nvPr>
+            <p:ph type="pic" sz="quarter" idx="13"/>
+          </p:nvPr>
+        </p:nvPicPr>
+        <p:blipFill>
+          <a:blip r:embed="rId4"/>
+          <a:srcRect t="-34470" b="-34470"/>
+          <a:stretch>
+            <a:fillRect/>
+          </a:stretch>
+        </p:blipFill>
+        <p:spPr/>
+      </p:pic>
+      <p:sp>
+        <p:nvSpPr>
+          <p:cNvPr id="7" name="Text Placeholder 6"/>
+          <p:cNvSpPr>
+            <a:spLocks noGrp="1"/>
+          </p:cNvSpPr>
+          <p:nvPr>
+            <p:ph type="body" sz="half" idx="2"/>
+          </p:nvPr>
+        </p:nvSpPr>
+        <p:spPr>
+          <a:xfrm>
+            <a:off x="343647" y="1778000"/>
+            <a:ext cx="4108823" cy="2042400"/>
+          </a:xfrm>
+        </p:spPr>
+        <p:txBody>
+          <a:bodyPr/>
+          <a:lstStyle/>
+          <a:p>
+            <a:r>
+              <a:rPr lang="en-US" sz="4000" dirty="0" smtClean="0"/>
+              <a:t>Mining Questions Asked by </a:t>
+            </a:r>
+          </a:p>
+          <a:p>
+            <a:r>
+              <a:rPr lang="en-US" sz="4000" dirty="0" smtClean="0"/>
+              <a:t>Web Developers</a:t>
+            </a:r>
+            <a:endParaRPr lang="en-US" sz="4000" dirty="0"/>
+          </a:p>
+        </p:txBody>
+      </p:sp>
+      <p:sp>
+        <p:nvSpPr>
+          <p:cNvPr id="2" name="Footer Placeholder 1"/>
           <p:cNvSpPr>
             <a:spLocks noGrp="1"/>
           </p:cNvSpPr>
@@ -16361,33 +16528,58 @@
           </a:p>
         </p:txBody>
       </p:sp>
-      <p:sp>
-        <p:nvSpPr>
-          <p:cNvPr id="4" name="Slide Number Placeholder 3"/>
-          <p:cNvSpPr>
-            <a:spLocks noGrp="1"/>
-          </p:cNvSpPr>
-          <p:nvPr>
-            <p:ph type="sldNum" sz="quarter" idx="12"/>
-          </p:nvPr>
-        </p:nvSpPr>
-        <p:spPr/>
-        <p:txBody>
-          <a:bodyPr/>
-          <a:lstStyle/>
-          <a:p>
-            <a:fld id="{5FD889E0-CAB2-4699-909D-B9A88D47ACBE}" type="slidenum">
-              <a:rPr lang="en-US" smtClean="0"/>
-              <a:t>1</a:t>
-            </a:fld>
-            <a:endParaRPr lang="en-US"/>
-          </a:p>
-        </p:txBody>
-      </p:sp>
+      <p:pic>
+        <p:nvPicPr>
+          <p:cNvPr id="3" name="Picture 2"/>
+          <p:cNvPicPr>
+            <a:picLocks noChangeAspect="1"/>
+          </p:cNvPicPr>
+          <p:nvPr/>
+        </p:nvPicPr>
+        <p:blipFill>
+          <a:blip r:embed="rId5"/>
+          <a:stretch>
+            <a:fillRect/>
+          </a:stretch>
+        </p:blipFill>
+        <p:spPr>
+          <a:xfrm>
+            <a:off x="1309453" y="5334172"/>
+            <a:ext cx="908500" cy="1239744"/>
+          </a:xfrm>
+          <a:prstGeom prst="rect">
+            <a:avLst/>
+          </a:prstGeom>
+        </p:spPr>
+      </p:pic>
+      <p:pic>
+        <p:nvPicPr>
+          <p:cNvPr id="4" name="Picture 3"/>
+          <p:cNvPicPr>
+            <a:picLocks noChangeAspect="1"/>
+          </p:cNvPicPr>
+          <p:nvPr/>
+        </p:nvPicPr>
+        <p:blipFill>
+          <a:blip r:embed="rId6"/>
+          <a:stretch>
+            <a:fillRect/>
+          </a:stretch>
+        </p:blipFill>
+        <p:spPr>
+          <a:xfrm>
+            <a:off x="6802438" y="5334172"/>
+            <a:ext cx="1239744" cy="1239744"/>
+          </a:xfrm>
+          <a:prstGeom prst="rect">
+            <a:avLst/>
+          </a:prstGeom>
+        </p:spPr>
+      </p:pic>
     </p:spTree>
     <p:extLst>
       <p:ext uri="{BB962C8B-B14F-4D97-AF65-F5344CB8AC3E}">
-        <p14:creationId xmlns:p14="http://schemas.microsoft.com/office/powerpoint/2010/main" val="711283231"/>
+        <p14:creationId xmlns:p14="http://schemas.microsoft.com/office/powerpoint/2010/main" val="2535697383"/>
       </p:ext>
     </p:extLst>
   </p:cSld>
@@ -16438,14 +16630,14 @@
           <a:p>
             <a:r>
               <a:rPr lang="en-US" dirty="0"/>
-              <a:t>RQ4: Prevalence of web in mobile development</a:t>
+              <a:t>RQ3: Temporal trends over time</a:t>
             </a:r>
           </a:p>
         </p:txBody>
       </p:sp>
       <p:pic>
         <p:nvPicPr>
-          <p:cNvPr id="7" name="Content Placeholder 4" descr="js-css-html5-share-mobile.pdf"/>
+          <p:cNvPr id="5" name="Content Placeholder 4" descr="JavaScriptTrend.pdf"/>
           <p:cNvPicPr>
             <a:picLocks noGrp="1" noChangeAspect="1"/>
           </p:cNvPicPr>
@@ -16455,13 +16647,14 @@
         </p:nvPicPr>
         <p:blipFill>
           <a:blip r:embed="rId2">
+            <a:alphaModFix amt="41000"/>
             <a:extLst>
               <a:ext uri="{28A0092B-C50C-407E-A947-70E740481C1C}">
                 <a14:useLocalDpi xmlns:a14="http://schemas.microsoft.com/office/drawing/2010/main" val="0"/>
               </a:ext>
             </a:extLst>
           </a:blip>
-          <a:srcRect l="-8980" r="-8980"/>
+          <a:srcRect l="-8607" r="-8607"/>
           <a:stretch>
             <a:fillRect/>
           </a:stretch>
@@ -16470,7 +16663,71 @@
       </p:pic>
       <p:sp>
         <p:nvSpPr>
-          <p:cNvPr id="5" name="Footer Placeholder 4"/>
+          <p:cNvPr id="6" name="Rectangle 5"/>
+          <p:cNvSpPr/>
+          <p:nvPr/>
+        </p:nvSpPr>
+        <p:spPr>
+          <a:xfrm>
+            <a:off x="612588" y="2659655"/>
+            <a:ext cx="7993530" cy="1673412"/>
+          </a:xfrm>
+          <a:prstGeom prst="rect">
+            <a:avLst/>
+          </a:prstGeom>
+        </p:spPr>
+        <p:style>
+          <a:lnRef idx="2">
+            <a:schemeClr val="accent3">
+              <a:shade val="50000"/>
+            </a:schemeClr>
+          </a:lnRef>
+          <a:fillRef idx="1">
+            <a:schemeClr val="accent3"/>
+          </a:fillRef>
+          <a:effectRef idx="0">
+            <a:schemeClr val="accent3"/>
+          </a:effectRef>
+          <a:fontRef idx="minor">
+            <a:schemeClr val="lt1"/>
+          </a:fontRef>
+        </p:style>
+        <p:txBody>
+          <a:bodyPr rtlCol="0" anchor="ctr"/>
+          <a:lstStyle/>
+          <a:p>
+            <a:pPr algn="ctr"/>
+            <a:r>
+              <a:rPr lang="en-US" sz="2400" dirty="0"/>
+              <a:t>Cross-browser compatibility issues have seen a sharp decline in the recent past. </a:t>
+            </a:r>
+            <a:endParaRPr lang="en-US" sz="2400" dirty="0" smtClean="0"/>
+          </a:p>
+          <a:p>
+            <a:pPr algn="ctr"/>
+            <a:endParaRPr lang="en-US" sz="2400" dirty="0" smtClean="0"/>
+          </a:p>
+          <a:p>
+            <a:pPr algn="ctr"/>
+            <a:r>
+              <a:rPr lang="en-US" sz="2400" dirty="0" smtClean="0"/>
+              <a:t>Further</a:t>
+            </a:r>
+            <a:r>
+              <a:rPr lang="en-US" sz="2400" dirty="0"/>
+              <a:t>, CSS3 and HTML5 discussions are gaining </a:t>
+            </a:r>
+            <a:r>
+              <a:rPr lang="en-US" sz="2400" dirty="0" smtClean="0"/>
+              <a:t>popularity.</a:t>
+            </a:r>
+            <a:endParaRPr lang="en-US" sz="2400" dirty="0"/>
+          </a:p>
+        </p:txBody>
+      </p:sp>
+      <p:sp>
+        <p:nvSpPr>
+          <p:cNvPr id="7" name="Footer Placeholder 6"/>
           <p:cNvSpPr>
             <a:spLocks noGrp="1"/>
           </p:cNvSpPr>
@@ -16493,7 +16750,7 @@
       </p:sp>
       <p:sp>
         <p:nvSpPr>
-          <p:cNvPr id="6" name="Slide Number Placeholder 5"/>
+          <p:cNvPr id="8" name="Slide Number Placeholder 7"/>
           <p:cNvSpPr>
             <a:spLocks noGrp="1"/>
           </p:cNvSpPr>
@@ -16517,7 +16774,7 @@
     </p:spTree>
     <p:extLst>
       <p:ext uri="{BB962C8B-B14F-4D97-AF65-F5344CB8AC3E}">
-        <p14:creationId xmlns:p14="http://schemas.microsoft.com/office/powerpoint/2010/main" val="2609287141"/>
+        <p14:creationId xmlns:p14="http://schemas.microsoft.com/office/powerpoint/2010/main" val="3188020155"/>
       </p:ext>
     </p:extLst>
   </p:cSld>
@@ -16585,7 +16842,6 @@
         </p:nvPicPr>
         <p:blipFill>
           <a:blip r:embed="rId2">
-            <a:alphaModFix amt="40000"/>
             <a:extLst>
               <a:ext uri="{28A0092B-C50C-407E-A947-70E740481C1C}">
                 <a14:useLocalDpi xmlns:a14="http://schemas.microsoft.com/office/drawing/2010/main" val="0"/>
@@ -16601,62 +16857,6 @@
       </p:pic>
       <p:sp>
         <p:nvSpPr>
-          <p:cNvPr id="8" name="Rectangle 7"/>
-          <p:cNvSpPr/>
-          <p:nvPr/>
-        </p:nvSpPr>
-        <p:spPr>
-          <a:xfrm>
-            <a:off x="612588" y="2659655"/>
-            <a:ext cx="7993530" cy="1673412"/>
-          </a:xfrm>
-          <a:prstGeom prst="rect">
-            <a:avLst/>
-          </a:prstGeom>
-        </p:spPr>
-        <p:style>
-          <a:lnRef idx="2">
-            <a:schemeClr val="accent3">
-              <a:shade val="50000"/>
-            </a:schemeClr>
-          </a:lnRef>
-          <a:fillRef idx="1">
-            <a:schemeClr val="accent3"/>
-          </a:fillRef>
-          <a:effectRef idx="0">
-            <a:schemeClr val="accent3"/>
-          </a:effectRef>
-          <a:fontRef idx="minor">
-            <a:schemeClr val="lt1"/>
-          </a:fontRef>
-        </p:style>
-        <p:txBody>
-          <a:bodyPr rtlCol="0" anchor="ctr"/>
-          <a:lstStyle/>
-          <a:p>
-            <a:pPr algn="ctr"/>
-            <a:r>
-              <a:rPr lang="en-US" sz="2400" dirty="0"/>
-              <a:t>Discussions related to Mobile </a:t>
-            </a:r>
-            <a:r>
-              <a:rPr lang="en-US" sz="2400" dirty="0" smtClean="0"/>
-              <a:t>development </a:t>
-            </a:r>
-            <a:r>
-              <a:rPr lang="en-US" sz="2400" dirty="0"/>
-              <a:t>are seeing an increasing share of web </a:t>
-            </a:r>
-            <a:r>
-              <a:rPr lang="en-US" sz="2400" dirty="0" smtClean="0"/>
-              <a:t>technologies. </a:t>
-            </a:r>
-            <a:endParaRPr lang="en-US" sz="2400" dirty="0"/>
-          </a:p>
-        </p:txBody>
-      </p:sp>
-      <p:sp>
-        <p:nvSpPr>
           <p:cNvPr id="5" name="Footer Placeholder 4"/>
           <p:cNvSpPr>
             <a:spLocks noGrp="1"/>
@@ -16704,7 +16904,7 @@
     </p:spTree>
     <p:extLst>
       <p:ext uri="{BB962C8B-B14F-4D97-AF65-F5344CB8AC3E}">
-        <p14:creationId xmlns:p14="http://schemas.microsoft.com/office/powerpoint/2010/main" val="2662496721"/>
+        <p14:creationId xmlns:p14="http://schemas.microsoft.com/office/powerpoint/2010/main" val="2609287141"/>
       </p:ext>
     </p:extLst>
   </p:cSld>
@@ -16754,6 +16954,193 @@
           <a:lstStyle/>
           <a:p>
             <a:r>
+              <a:rPr lang="en-US" dirty="0"/>
+              <a:t>RQ4: Prevalence of web in mobile development</a:t>
+            </a:r>
+          </a:p>
+        </p:txBody>
+      </p:sp>
+      <p:pic>
+        <p:nvPicPr>
+          <p:cNvPr id="7" name="Content Placeholder 4" descr="js-css-html5-share-mobile.pdf"/>
+          <p:cNvPicPr>
+            <a:picLocks noGrp="1" noChangeAspect="1"/>
+          </p:cNvPicPr>
+          <p:nvPr>
+            <p:ph idx="1"/>
+          </p:nvPr>
+        </p:nvPicPr>
+        <p:blipFill>
+          <a:blip r:embed="rId2">
+            <a:alphaModFix amt="40000"/>
+            <a:extLst>
+              <a:ext uri="{28A0092B-C50C-407E-A947-70E740481C1C}">
+                <a14:useLocalDpi xmlns:a14="http://schemas.microsoft.com/office/drawing/2010/main" val="0"/>
+              </a:ext>
+            </a:extLst>
+          </a:blip>
+          <a:srcRect l="-8980" r="-8980"/>
+          <a:stretch>
+            <a:fillRect/>
+          </a:stretch>
+        </p:blipFill>
+        <p:spPr/>
+      </p:pic>
+      <p:sp>
+        <p:nvSpPr>
+          <p:cNvPr id="8" name="Rectangle 7"/>
+          <p:cNvSpPr/>
+          <p:nvPr/>
+        </p:nvSpPr>
+        <p:spPr>
+          <a:xfrm>
+            <a:off x="612588" y="2659655"/>
+            <a:ext cx="7993530" cy="1673412"/>
+          </a:xfrm>
+          <a:prstGeom prst="rect">
+            <a:avLst/>
+          </a:prstGeom>
+        </p:spPr>
+        <p:style>
+          <a:lnRef idx="2">
+            <a:schemeClr val="accent3">
+              <a:shade val="50000"/>
+            </a:schemeClr>
+          </a:lnRef>
+          <a:fillRef idx="1">
+            <a:schemeClr val="accent3"/>
+          </a:fillRef>
+          <a:effectRef idx="0">
+            <a:schemeClr val="accent3"/>
+          </a:effectRef>
+          <a:fontRef idx="minor">
+            <a:schemeClr val="lt1"/>
+          </a:fontRef>
+        </p:style>
+        <p:txBody>
+          <a:bodyPr rtlCol="0" anchor="ctr"/>
+          <a:lstStyle/>
+          <a:p>
+            <a:pPr algn="ctr"/>
+            <a:r>
+              <a:rPr lang="en-US" sz="2400" dirty="0"/>
+              <a:t>Discussions related to Mobile </a:t>
+            </a:r>
+            <a:r>
+              <a:rPr lang="en-US" sz="2400" dirty="0" smtClean="0"/>
+              <a:t>development </a:t>
+            </a:r>
+            <a:r>
+              <a:rPr lang="en-US" sz="2400" dirty="0"/>
+              <a:t>are seeing an increasing share of web </a:t>
+            </a:r>
+            <a:r>
+              <a:rPr lang="en-US" sz="2400" dirty="0" smtClean="0"/>
+              <a:t>technologies. </a:t>
+            </a:r>
+            <a:endParaRPr lang="en-US" sz="2400" dirty="0"/>
+          </a:p>
+        </p:txBody>
+      </p:sp>
+      <p:sp>
+        <p:nvSpPr>
+          <p:cNvPr id="5" name="Footer Placeholder 4"/>
+          <p:cNvSpPr>
+            <a:spLocks noGrp="1"/>
+          </p:cNvSpPr>
+          <p:nvPr>
+            <p:ph type="ftr" sz="quarter" idx="11"/>
+          </p:nvPr>
+        </p:nvSpPr>
+        <p:spPr/>
+        <p:txBody>
+          <a:bodyPr/>
+          <a:lstStyle/>
+          <a:p>
+            <a:r>
+              <a:rPr lang="sk-SK" smtClean="0"/>
+              <a:t>MSR 2014</a:t>
+            </a:r>
+            <a:endParaRPr lang="en-US"/>
+          </a:p>
+        </p:txBody>
+      </p:sp>
+      <p:sp>
+        <p:nvSpPr>
+          <p:cNvPr id="6" name="Slide Number Placeholder 5"/>
+          <p:cNvSpPr>
+            <a:spLocks noGrp="1"/>
+          </p:cNvSpPr>
+          <p:nvPr>
+            <p:ph type="sldNum" sz="quarter" idx="12"/>
+          </p:nvPr>
+        </p:nvSpPr>
+        <p:spPr/>
+        <p:txBody>
+          <a:bodyPr/>
+          <a:lstStyle/>
+          <a:p>
+            <a:fld id="{5FD889E0-CAB2-4699-909D-B9A88D47ACBE}" type="slidenum">
+              <a:rPr lang="en-US" smtClean="0"/>
+              <a:t>21</a:t>
+            </a:fld>
+            <a:endParaRPr lang="en-US"/>
+          </a:p>
+        </p:txBody>
+      </p:sp>
+    </p:spTree>
+    <p:extLst>
+      <p:ext uri="{BB962C8B-B14F-4D97-AF65-F5344CB8AC3E}">
+        <p14:creationId xmlns:p14="http://schemas.microsoft.com/office/powerpoint/2010/main" val="2662496721"/>
+      </p:ext>
+    </p:extLst>
+  </p:cSld>
+  <p:clrMapOvr>
+    <a:masterClrMapping/>
+  </p:clrMapOvr>
+  <p:timing>
+    <p:tnLst>
+      <p:par>
+        <p:cTn xmlns:p14="http://schemas.microsoft.com/office/powerpoint/2010/main" id="1" dur="indefinite" restart="never" nodeType="tmRoot"/>
+      </p:par>
+    </p:tnLst>
+  </p:timing>
+</p:sld>
+</file>
+
+<file path=ppt/slides/slide23.xml><?xml version="1.0" encoding="utf-8"?>
+<p:sld xmlns:a="http://schemas.openxmlformats.org/drawingml/2006/main" xmlns:r="http://schemas.openxmlformats.org/officeDocument/2006/relationships" xmlns:p="http://schemas.openxmlformats.org/presentationml/2006/main">
+  <p:cSld>
+    <p:spTree>
+      <p:nvGrpSpPr>
+        <p:cNvPr id="1" name=""/>
+        <p:cNvGrpSpPr/>
+        <p:nvPr/>
+      </p:nvGrpSpPr>
+      <p:grpSpPr>
+        <a:xfrm>
+          <a:off x="0" y="0"/>
+          <a:ext cx="0" cy="0"/>
+          <a:chOff x="0" y="0"/>
+          <a:chExt cx="0" cy="0"/>
+        </a:xfrm>
+      </p:grpSpPr>
+      <p:sp>
+        <p:nvSpPr>
+          <p:cNvPr id="2" name="Title 1"/>
+          <p:cNvSpPr>
+            <a:spLocks noGrp="1"/>
+          </p:cNvSpPr>
+          <p:nvPr>
+            <p:ph type="title"/>
+          </p:nvPr>
+        </p:nvSpPr>
+        <p:spPr/>
+        <p:txBody>
+          <a:bodyPr/>
+          <a:lstStyle/>
+          <a:p>
+            <a:r>
               <a:rPr lang="en-US" dirty="0" smtClean="0"/>
               <a:t>Popularity</a:t>
             </a:r>
@@ -16847,7 +17234,7 @@
           <a:p>
             <a:fld id="{5FD889E0-CAB2-4699-909D-B9A88D47ACBE}" type="slidenum">
               <a:rPr lang="en-US" smtClean="0"/>
-              <a:t>21</a:t>
+              <a:t>22</a:t>
             </a:fld>
             <a:endParaRPr lang="en-US"/>
           </a:p>
@@ -17107,7 +17494,7 @@
 </p:sld>
 </file>
 
-<file path=ppt/slides/slide23.xml><?xml version="1.0" encoding="utf-8"?>
+<file path=ppt/slides/slide24.xml><?xml version="1.0" encoding="utf-8"?>
 <p:sld xmlns:a="http://schemas.openxmlformats.org/drawingml/2006/main" xmlns:r="http://schemas.openxmlformats.org/officeDocument/2006/relationships" xmlns:p="http://schemas.openxmlformats.org/presentationml/2006/main">
   <p:cSld>
     <p:spTree>
@@ -17313,7 +17700,7 @@
           <a:p>
             <a:fld id="{5FD889E0-CAB2-4699-909D-B9A88D47ACBE}" type="slidenum">
               <a:rPr lang="en-US" smtClean="0"/>
-              <a:t>22</a:t>
+              <a:t>23</a:t>
             </a:fld>
             <a:endParaRPr lang="en-US"/>
           </a:p>
@@ -17323,200 +17710,6 @@
     <p:extLst>
       <p:ext uri="{BB962C8B-B14F-4D97-AF65-F5344CB8AC3E}">
         <p14:creationId xmlns:p14="http://schemas.microsoft.com/office/powerpoint/2010/main" val="3476597873"/>
-      </p:ext>
-    </p:extLst>
-  </p:cSld>
-  <p:clrMapOvr>
-    <a:masterClrMapping/>
-  </p:clrMapOvr>
-  <p:timing>
-    <p:tnLst>
-      <p:par>
-        <p:cTn xmlns:p14="http://schemas.microsoft.com/office/powerpoint/2010/main" id="1" dur="indefinite" restart="never" nodeType="tmRoot"/>
-      </p:par>
-    </p:tnLst>
-  </p:timing>
-</p:sld>
-</file>
-
-<file path=ppt/slides/slide24.xml><?xml version="1.0" encoding="utf-8"?>
-<p:sld xmlns:a="http://schemas.openxmlformats.org/drawingml/2006/main" xmlns:r="http://schemas.openxmlformats.org/officeDocument/2006/relationships" xmlns:p="http://schemas.openxmlformats.org/presentationml/2006/main">
-  <p:cSld>
-    <p:spTree>
-      <p:nvGrpSpPr>
-        <p:cNvPr id="1" name=""/>
-        <p:cNvGrpSpPr/>
-        <p:nvPr/>
-      </p:nvGrpSpPr>
-      <p:grpSpPr>
-        <a:xfrm>
-          <a:off x="0" y="0"/>
-          <a:ext cx="0" cy="0"/>
-          <a:chOff x="0" y="0"/>
-          <a:chExt cx="0" cy="0"/>
-        </a:xfrm>
-      </p:grpSpPr>
-      <p:sp>
-        <p:nvSpPr>
-          <p:cNvPr id="2" name="Title 1"/>
-          <p:cNvSpPr>
-            <a:spLocks noGrp="1"/>
-          </p:cNvSpPr>
-          <p:nvPr>
-            <p:ph type="title"/>
-          </p:nvPr>
-        </p:nvSpPr>
-        <p:spPr/>
-        <p:txBody>
-          <a:bodyPr/>
-          <a:lstStyle/>
-          <a:p>
-            <a:r>
-              <a:rPr lang="en-US" dirty="0" err="1" smtClean="0"/>
-              <a:t>StackOverflow</a:t>
-            </a:r>
-            <a:r>
-              <a:rPr lang="en-US" dirty="0" smtClean="0"/>
-              <a:t> Post Score </a:t>
-            </a:r>
-            <a:endParaRPr lang="en-US" dirty="0"/>
-          </a:p>
-        </p:txBody>
-      </p:sp>
-      <p:sp>
-        <p:nvSpPr>
-          <p:cNvPr id="3" name="Content Placeholder 2"/>
-          <p:cNvSpPr>
-            <a:spLocks noGrp="1"/>
-          </p:cNvSpPr>
-          <p:nvPr>
-            <p:ph idx="1"/>
-          </p:nvPr>
-        </p:nvSpPr>
-        <p:spPr/>
-        <p:txBody>
-          <a:bodyPr>
-            <a:normAutofit/>
-          </a:bodyPr>
-          <a:lstStyle/>
-          <a:p>
-            <a:r>
-              <a:rPr lang="en-US" sz="2400" dirty="0" smtClean="0"/>
-              <a:t>Missing details</a:t>
-            </a:r>
-          </a:p>
-          <a:p>
-            <a:pPr lvl="1"/>
-            <a:r>
-              <a:rPr lang="en-US" sz="2000" dirty="0" smtClean="0">
-                <a:solidFill>
-                  <a:srgbClr val="FF0000"/>
-                </a:solidFill>
-              </a:rPr>
-              <a:t>How many users up voted or down voted the question?</a:t>
-            </a:r>
-          </a:p>
-          <a:p>
-            <a:pPr lvl="1"/>
-            <a:r>
-              <a:rPr lang="en-US" sz="2000" dirty="0" smtClean="0">
-                <a:solidFill>
-                  <a:srgbClr val="FF0000"/>
-                </a:solidFill>
-              </a:rPr>
-              <a:t>How many users tried to answer the question?</a:t>
-            </a:r>
-          </a:p>
-          <a:p>
-            <a:pPr lvl="1"/>
-            <a:r>
-              <a:rPr lang="en-US" sz="2000" dirty="0" smtClean="0">
-                <a:solidFill>
-                  <a:srgbClr val="FF0000"/>
-                </a:solidFill>
-              </a:rPr>
-              <a:t>Is there an accepted answer for this question?</a:t>
-            </a:r>
-          </a:p>
-          <a:p>
-            <a:pPr lvl="1"/>
-            <a:r>
-              <a:rPr lang="en-US" sz="2000" dirty="0" smtClean="0">
-                <a:solidFill>
-                  <a:srgbClr val="FF0000"/>
-                </a:solidFill>
-              </a:rPr>
-              <a:t>How many users are following the question?</a:t>
-            </a:r>
-          </a:p>
-          <a:p>
-            <a:pPr lvl="1"/>
-            <a:r>
-              <a:rPr lang="en-US" sz="2000" dirty="0" smtClean="0">
-                <a:solidFill>
-                  <a:srgbClr val="FF0000"/>
-                </a:solidFill>
-              </a:rPr>
-              <a:t>How many users are participating in the discussion?</a:t>
-            </a:r>
-            <a:endParaRPr lang="en-US" sz="2000" dirty="0">
-              <a:solidFill>
-                <a:srgbClr val="FF0000"/>
-              </a:solidFill>
-            </a:endParaRPr>
-          </a:p>
-        </p:txBody>
-      </p:sp>
-      <p:sp>
-        <p:nvSpPr>
-          <p:cNvPr id="6" name="Footer Placeholder 5"/>
-          <p:cNvSpPr>
-            <a:spLocks noGrp="1"/>
-          </p:cNvSpPr>
-          <p:nvPr>
-            <p:ph type="ftr" sz="quarter" idx="11"/>
-          </p:nvPr>
-        </p:nvSpPr>
-        <p:spPr/>
-        <p:txBody>
-          <a:bodyPr/>
-          <a:lstStyle/>
-          <a:p>
-            <a:r>
-              <a:rPr lang="sk-SK" smtClean="0"/>
-              <a:t>MSR 2014</a:t>
-            </a:r>
-            <a:endParaRPr lang="en-US"/>
-          </a:p>
-        </p:txBody>
-      </p:sp>
-      <p:sp>
-        <p:nvSpPr>
-          <p:cNvPr id="7" name="Slide Number Placeholder 6"/>
-          <p:cNvSpPr>
-            <a:spLocks noGrp="1"/>
-          </p:cNvSpPr>
-          <p:nvPr>
-            <p:ph type="sldNum" sz="quarter" idx="12"/>
-          </p:nvPr>
-        </p:nvSpPr>
-        <p:spPr/>
-        <p:txBody>
-          <a:bodyPr/>
-          <a:lstStyle/>
-          <a:p>
-            <a:fld id="{5FD889E0-CAB2-4699-909D-B9A88D47ACBE}" type="slidenum">
-              <a:rPr lang="en-US" smtClean="0"/>
-              <a:t>23</a:t>
-            </a:fld>
-            <a:endParaRPr lang="en-US"/>
-          </a:p>
-        </p:txBody>
-      </p:sp>
-    </p:spTree>
-    <p:extLst>
-      <p:ext uri="{BB962C8B-B14F-4D97-AF65-F5344CB8AC3E}">
-        <p14:creationId xmlns:p14="http://schemas.microsoft.com/office/powerpoint/2010/main" val="2903361593"/>
       </p:ext>
     </p:extLst>
   </p:cSld>
@@ -17595,6 +17788,200 @@
           <a:lstStyle/>
           <a:p>
             <a:r>
+              <a:rPr lang="en-US" sz="2400" dirty="0" smtClean="0"/>
+              <a:t>Missing details</a:t>
+            </a:r>
+          </a:p>
+          <a:p>
+            <a:pPr lvl="1"/>
+            <a:r>
+              <a:rPr lang="en-US" sz="2000" dirty="0" smtClean="0">
+                <a:solidFill>
+                  <a:srgbClr val="FF0000"/>
+                </a:solidFill>
+              </a:rPr>
+              <a:t>How many users up voted or down voted the question?</a:t>
+            </a:r>
+          </a:p>
+          <a:p>
+            <a:pPr lvl="1"/>
+            <a:r>
+              <a:rPr lang="en-US" sz="2000" dirty="0" smtClean="0">
+                <a:solidFill>
+                  <a:srgbClr val="FF0000"/>
+                </a:solidFill>
+              </a:rPr>
+              <a:t>How many users tried to answer the question?</a:t>
+            </a:r>
+          </a:p>
+          <a:p>
+            <a:pPr lvl="1"/>
+            <a:r>
+              <a:rPr lang="en-US" sz="2000" dirty="0" smtClean="0">
+                <a:solidFill>
+                  <a:srgbClr val="FF0000"/>
+                </a:solidFill>
+              </a:rPr>
+              <a:t>Is there an accepted answer for this question?</a:t>
+            </a:r>
+          </a:p>
+          <a:p>
+            <a:pPr lvl="1"/>
+            <a:r>
+              <a:rPr lang="en-US" sz="2000" dirty="0" smtClean="0">
+                <a:solidFill>
+                  <a:srgbClr val="FF0000"/>
+                </a:solidFill>
+              </a:rPr>
+              <a:t>How many users are following the question?</a:t>
+            </a:r>
+          </a:p>
+          <a:p>
+            <a:pPr lvl="1"/>
+            <a:r>
+              <a:rPr lang="en-US" sz="2000" dirty="0" smtClean="0">
+                <a:solidFill>
+                  <a:srgbClr val="FF0000"/>
+                </a:solidFill>
+              </a:rPr>
+              <a:t>How many users are participating in the discussion?</a:t>
+            </a:r>
+            <a:endParaRPr lang="en-US" sz="2000" dirty="0">
+              <a:solidFill>
+                <a:srgbClr val="FF0000"/>
+              </a:solidFill>
+            </a:endParaRPr>
+          </a:p>
+        </p:txBody>
+      </p:sp>
+      <p:sp>
+        <p:nvSpPr>
+          <p:cNvPr id="6" name="Footer Placeholder 5"/>
+          <p:cNvSpPr>
+            <a:spLocks noGrp="1"/>
+          </p:cNvSpPr>
+          <p:nvPr>
+            <p:ph type="ftr" sz="quarter" idx="11"/>
+          </p:nvPr>
+        </p:nvSpPr>
+        <p:spPr/>
+        <p:txBody>
+          <a:bodyPr/>
+          <a:lstStyle/>
+          <a:p>
+            <a:r>
+              <a:rPr lang="sk-SK" smtClean="0"/>
+              <a:t>MSR 2014</a:t>
+            </a:r>
+            <a:endParaRPr lang="en-US"/>
+          </a:p>
+        </p:txBody>
+      </p:sp>
+      <p:sp>
+        <p:nvSpPr>
+          <p:cNvPr id="7" name="Slide Number Placeholder 6"/>
+          <p:cNvSpPr>
+            <a:spLocks noGrp="1"/>
+          </p:cNvSpPr>
+          <p:nvPr>
+            <p:ph type="sldNum" sz="quarter" idx="12"/>
+          </p:nvPr>
+        </p:nvSpPr>
+        <p:spPr/>
+        <p:txBody>
+          <a:bodyPr/>
+          <a:lstStyle/>
+          <a:p>
+            <a:fld id="{5FD889E0-CAB2-4699-909D-B9A88D47ACBE}" type="slidenum">
+              <a:rPr lang="en-US" smtClean="0"/>
+              <a:t>24</a:t>
+            </a:fld>
+            <a:endParaRPr lang="en-US"/>
+          </a:p>
+        </p:txBody>
+      </p:sp>
+    </p:spTree>
+    <p:extLst>
+      <p:ext uri="{BB962C8B-B14F-4D97-AF65-F5344CB8AC3E}">
+        <p14:creationId xmlns:p14="http://schemas.microsoft.com/office/powerpoint/2010/main" val="2903361593"/>
+      </p:ext>
+    </p:extLst>
+  </p:cSld>
+  <p:clrMapOvr>
+    <a:masterClrMapping/>
+  </p:clrMapOvr>
+  <p:timing>
+    <p:tnLst>
+      <p:par>
+        <p:cTn xmlns:p14="http://schemas.microsoft.com/office/powerpoint/2010/main" id="1" dur="indefinite" restart="never" nodeType="tmRoot"/>
+      </p:par>
+    </p:tnLst>
+  </p:timing>
+</p:sld>
+</file>
+
+<file path=ppt/slides/slide26.xml><?xml version="1.0" encoding="utf-8"?>
+<p:sld xmlns:a="http://schemas.openxmlformats.org/drawingml/2006/main" xmlns:r="http://schemas.openxmlformats.org/officeDocument/2006/relationships" xmlns:p="http://schemas.openxmlformats.org/presentationml/2006/main">
+  <p:cSld>
+    <p:spTree>
+      <p:nvGrpSpPr>
+        <p:cNvPr id="1" name=""/>
+        <p:cNvGrpSpPr/>
+        <p:nvPr/>
+      </p:nvGrpSpPr>
+      <p:grpSpPr>
+        <a:xfrm>
+          <a:off x="0" y="0"/>
+          <a:ext cx="0" cy="0"/>
+          <a:chOff x="0" y="0"/>
+          <a:chExt cx="0" cy="0"/>
+        </a:xfrm>
+      </p:grpSpPr>
+      <p:sp>
+        <p:nvSpPr>
+          <p:cNvPr id="2" name="Title 1"/>
+          <p:cNvSpPr>
+            <a:spLocks noGrp="1"/>
+          </p:cNvSpPr>
+          <p:nvPr>
+            <p:ph type="title"/>
+          </p:nvPr>
+        </p:nvSpPr>
+        <p:spPr/>
+        <p:txBody>
+          <a:bodyPr/>
+          <a:lstStyle/>
+          <a:p>
+            <a:r>
+              <a:rPr lang="en-US" dirty="0" err="1" smtClean="0"/>
+              <a:t>StackOverflow</a:t>
+            </a:r>
+            <a:r>
+              <a:rPr lang="en-US" dirty="0" smtClean="0"/>
+              <a:t> Post Score </a:t>
+            </a:r>
+            <a:endParaRPr lang="en-US" dirty="0"/>
+          </a:p>
+        </p:txBody>
+      </p:sp>
+      <p:sp>
+        <p:nvSpPr>
+          <p:cNvPr id="3" name="Content Placeholder 2"/>
+          <p:cNvSpPr>
+            <a:spLocks noGrp="1"/>
+          </p:cNvSpPr>
+          <p:nvPr>
+            <p:ph idx="1"/>
+          </p:nvPr>
+        </p:nvSpPr>
+        <p:spPr/>
+        <p:txBody>
+          <a:bodyPr>
+            <a:normAutofit/>
+          </a:bodyPr>
+          <a:lstStyle/>
+          <a:p>
+            <a:r>
               <a:rPr lang="en-US" sz="2400" dirty="0" smtClean="0">
                 <a:solidFill>
                   <a:srgbClr val="7F7F7F"/>
@@ -17705,7 +18092,7 @@
           <a:p>
             <a:fld id="{5FD889E0-CAB2-4699-909D-B9A88D47ACBE}" type="slidenum">
               <a:rPr lang="en-US" smtClean="0"/>
-              <a:t>24</a:t>
+              <a:t>25</a:t>
             </a:fld>
             <a:endParaRPr lang="en-US"/>
           </a:p>
@@ -17775,7 +18162,7 @@
 </p:sld>
 </file>
 
-<file path=ppt/slides/slide26.xml><?xml version="1.0" encoding="utf-8"?>
+<file path=ppt/slides/slide27.xml><?xml version="1.0" encoding="utf-8"?>
 <p:sld xmlns:a="http://schemas.openxmlformats.org/drawingml/2006/main" xmlns:r="http://schemas.openxmlformats.org/officeDocument/2006/relationships" xmlns:p="http://schemas.openxmlformats.org/presentationml/2006/main">
   <p:cSld>
     <p:spTree>
@@ -17962,7 +18349,7 @@
           <a:p>
             <a:fld id="{5FD889E0-CAB2-4699-909D-B9A88D47ACBE}" type="slidenum">
               <a:rPr lang="en-US" smtClean="0"/>
-              <a:t>25</a:t>
+              <a:t>26</a:t>
             </a:fld>
             <a:endParaRPr lang="en-US"/>
           </a:p>
@@ -17988,7 +18375,7 @@
 </p:sld>
 </file>
 
-<file path=ppt/slides/slide27.xml><?xml version="1.0" encoding="utf-8"?>
+<file path=ppt/slides/slide28.xml><?xml version="1.0" encoding="utf-8"?>
 <p:sld xmlns:a="http://schemas.openxmlformats.org/drawingml/2006/main" xmlns:r="http://schemas.openxmlformats.org/officeDocument/2006/relationships" xmlns:p="http://schemas.openxmlformats.org/presentationml/2006/main">
   <p:cSld>
     <p:spTree>
@@ -18263,7 +18650,7 @@
           <a:p>
             <a:fld id="{5FD889E0-CAB2-4699-909D-B9A88D47ACBE}" type="slidenum">
               <a:rPr lang="en-US" smtClean="0"/>
-              <a:t>26</a:t>
+              <a:t>27</a:t>
             </a:fld>
             <a:endParaRPr lang="en-US"/>
           </a:p>
@@ -18289,7 +18676,7 @@
 </p:sld>
 </file>
 
-<file path=ppt/slides/slide28.xml><?xml version="1.0" encoding="utf-8"?>
+<file path=ppt/slides/slide29.xml><?xml version="1.0" encoding="utf-8"?>
 <p:sld xmlns:a="http://schemas.openxmlformats.org/drawingml/2006/main" xmlns:r="http://schemas.openxmlformats.org/officeDocument/2006/relationships" xmlns:p="http://schemas.openxmlformats.org/presentationml/2006/main">
   <p:cSld>
     <p:spTree>
@@ -18451,7 +18838,7 @@
           <a:p>
             <a:fld id="{5FD889E0-CAB2-4699-909D-B9A88D47ACBE}" type="slidenum">
               <a:rPr lang="en-US" smtClean="0"/>
-              <a:t>27</a:t>
+              <a:t>28</a:t>
             </a:fld>
             <a:endParaRPr lang="en-US"/>
           </a:p>
@@ -18477,7 +18864,192 @@
 </p:sld>
 </file>
 
-<file path=ppt/slides/slide29.xml><?xml version="1.0" encoding="utf-8"?>
+<file path=ppt/slides/slide3.xml><?xml version="1.0" encoding="utf-8"?>
+<p:sld xmlns:a="http://schemas.openxmlformats.org/drawingml/2006/main" xmlns:r="http://schemas.openxmlformats.org/officeDocument/2006/relationships" xmlns:p="http://schemas.openxmlformats.org/presentationml/2006/main">
+  <p:cSld>
+    <p:spTree>
+      <p:nvGrpSpPr>
+        <p:cNvPr id="1" name=""/>
+        <p:cNvGrpSpPr/>
+        <p:nvPr/>
+      </p:nvGrpSpPr>
+      <p:grpSpPr>
+        <a:xfrm>
+          <a:off x="0" y="0"/>
+          <a:ext cx="0" cy="0"/>
+          <a:chOff x="0" y="0"/>
+          <a:chExt cx="0" cy="0"/>
+        </a:xfrm>
+      </p:grpSpPr>
+      <p:sp>
+        <p:nvSpPr>
+          <p:cNvPr id="7" name="Title 6"/>
+          <p:cNvSpPr>
+            <a:spLocks noGrp="1"/>
+          </p:cNvSpPr>
+          <p:nvPr>
+            <p:ph type="title"/>
+          </p:nvPr>
+        </p:nvSpPr>
+        <p:spPr/>
+        <p:txBody>
+          <a:bodyPr/>
+          <a:lstStyle/>
+          <a:p>
+            <a:r>
+              <a:rPr lang="en-US" dirty="0" smtClean="0"/>
+              <a:t>Problem Statement</a:t>
+            </a:r>
+            <a:endParaRPr lang="en-US" dirty="0"/>
+          </a:p>
+        </p:txBody>
+      </p:sp>
+      <p:sp>
+        <p:nvSpPr>
+          <p:cNvPr id="8" name="Content Placeholder 7"/>
+          <p:cNvSpPr>
+            <a:spLocks noGrp="1"/>
+          </p:cNvSpPr>
+          <p:nvPr>
+            <p:ph idx="1"/>
+          </p:nvPr>
+        </p:nvSpPr>
+        <p:spPr/>
+        <p:txBody>
+          <a:bodyPr>
+            <a:noAutofit/>
+          </a:bodyPr>
+          <a:lstStyle/>
+          <a:p>
+            <a:r>
+              <a:rPr lang="en-US" sz="2400" dirty="0"/>
+              <a:t>Web applications are becoming popular over time</a:t>
+            </a:r>
+          </a:p>
+          <a:p>
+            <a:pPr lvl="1"/>
+            <a:r>
+              <a:rPr lang="en-US" sz="2200" dirty="0"/>
+              <a:t>[</a:t>
+            </a:r>
+            <a:r>
+              <a:rPr lang="en-US" sz="2200" dirty="0" err="1"/>
+              <a:t>Jazayeri</a:t>
+            </a:r>
+            <a:r>
+              <a:rPr lang="en-US" sz="2200" dirty="0"/>
+              <a:t> et al</a:t>
+            </a:r>
+            <a:r>
+              <a:rPr lang="en-US" sz="2200" dirty="0" smtClean="0"/>
+              <a:t>., </a:t>
+            </a:r>
+            <a:r>
+              <a:rPr lang="en-US" sz="2200" dirty="0"/>
+              <a:t>FOSE 2007</a:t>
+            </a:r>
+            <a:r>
+              <a:rPr lang="en-US" sz="2200" dirty="0" smtClean="0"/>
+              <a:t>]</a:t>
+            </a:r>
+          </a:p>
+          <a:p>
+            <a:pPr lvl="1"/>
+            <a:endParaRPr lang="en-US" sz="2200" dirty="0"/>
+          </a:p>
+          <a:p>
+            <a:r>
+              <a:rPr lang="en-US" sz="2400" dirty="0" smtClean="0"/>
+              <a:t>Complex integration of JavaScript, CSS, and HTML</a:t>
+            </a:r>
+            <a:endParaRPr lang="en-US" sz="2400" dirty="0"/>
+          </a:p>
+          <a:p>
+            <a:endParaRPr lang="en-US" sz="2400" dirty="0"/>
+          </a:p>
+          <a:p>
+            <a:r>
+              <a:rPr lang="en-US" sz="2400" dirty="0" smtClean="0"/>
+              <a:t>JavaScript code often experiences errors</a:t>
+            </a:r>
+          </a:p>
+          <a:p>
+            <a:pPr lvl="1"/>
+            <a:r>
+              <a:rPr lang="en-US" sz="2200" dirty="0" smtClean="0"/>
+              <a:t>[Ocariza et al., ISSRE 2011]</a:t>
+            </a:r>
+            <a:endParaRPr lang="en-US" sz="2200" dirty="0"/>
+          </a:p>
+        </p:txBody>
+      </p:sp>
+      <p:sp>
+        <p:nvSpPr>
+          <p:cNvPr id="3" name="Footer Placeholder 2"/>
+          <p:cNvSpPr>
+            <a:spLocks noGrp="1"/>
+          </p:cNvSpPr>
+          <p:nvPr>
+            <p:ph type="ftr" sz="quarter" idx="11"/>
+          </p:nvPr>
+        </p:nvSpPr>
+        <p:spPr/>
+        <p:txBody>
+          <a:bodyPr/>
+          <a:lstStyle/>
+          <a:p>
+            <a:r>
+              <a:rPr lang="sk-SK" smtClean="0"/>
+              <a:t>MSR 2014</a:t>
+            </a:r>
+            <a:endParaRPr lang="en-US"/>
+          </a:p>
+        </p:txBody>
+      </p:sp>
+      <p:sp>
+        <p:nvSpPr>
+          <p:cNvPr id="4" name="Slide Number Placeholder 3"/>
+          <p:cNvSpPr>
+            <a:spLocks noGrp="1"/>
+          </p:cNvSpPr>
+          <p:nvPr>
+            <p:ph type="sldNum" sz="quarter" idx="12"/>
+          </p:nvPr>
+        </p:nvSpPr>
+        <p:spPr/>
+        <p:txBody>
+          <a:bodyPr/>
+          <a:lstStyle/>
+          <a:p>
+            <a:fld id="{5FD889E0-CAB2-4699-909D-B9A88D47ACBE}" type="slidenum">
+              <a:rPr lang="en-US" smtClean="0"/>
+              <a:t>2</a:t>
+            </a:fld>
+            <a:endParaRPr lang="en-US"/>
+          </a:p>
+        </p:txBody>
+      </p:sp>
+    </p:spTree>
+    <p:extLst>
+      <p:ext uri="{BB962C8B-B14F-4D97-AF65-F5344CB8AC3E}">
+        <p14:creationId xmlns:p14="http://schemas.microsoft.com/office/powerpoint/2010/main" val="711283231"/>
+      </p:ext>
+    </p:extLst>
+  </p:cSld>
+  <p:clrMapOvr>
+    <a:masterClrMapping/>
+  </p:clrMapOvr>
+  <p:timing>
+    <p:tnLst>
+      <p:par>
+        <p:cTn xmlns:p14="http://schemas.microsoft.com/office/powerpoint/2010/main" id="1" dur="indefinite" restart="never" nodeType="tmRoot"/>
+      </p:par>
+    </p:tnLst>
+  </p:timing>
+</p:sld>
+</file>
+
+<file path=ppt/slides/slide30.xml><?xml version="1.0" encoding="utf-8"?>
 <p:sld xmlns:a="http://schemas.openxmlformats.org/drawingml/2006/main" xmlns:r="http://schemas.openxmlformats.org/officeDocument/2006/relationships" xmlns:p="http://schemas.openxmlformats.org/presentationml/2006/main">
   <p:cSld>
     <p:spTree>
@@ -18731,7 +19303,7 @@
           <a:p>
             <a:fld id="{5FD889E0-CAB2-4699-909D-B9A88D47ACBE}" type="slidenum">
               <a:rPr lang="en-US" smtClean="0"/>
-              <a:t>28</a:t>
+              <a:t>29</a:t>
             </a:fld>
             <a:endParaRPr lang="en-US"/>
           </a:p>
@@ -19138,155 +19710,6 @@
 </p:sld>
 </file>
 
-<file path=ppt/slides/slide3.xml><?xml version="1.0" encoding="utf-8"?>
-<p:sld xmlns:a="http://schemas.openxmlformats.org/drawingml/2006/main" xmlns:r="http://schemas.openxmlformats.org/officeDocument/2006/relationships" xmlns:p="http://schemas.openxmlformats.org/presentationml/2006/main">
-  <p:cSld>
-    <p:spTree>
-      <p:nvGrpSpPr>
-        <p:cNvPr id="1" name=""/>
-        <p:cNvGrpSpPr/>
-        <p:nvPr/>
-      </p:nvGrpSpPr>
-      <p:grpSpPr>
-        <a:xfrm>
-          <a:off x="0" y="0"/>
-          <a:ext cx="0" cy="0"/>
-          <a:chOff x="0" y="0"/>
-          <a:chExt cx="0" cy="0"/>
-        </a:xfrm>
-      </p:grpSpPr>
-      <p:sp>
-        <p:nvSpPr>
-          <p:cNvPr id="2" name="Title 1"/>
-          <p:cNvSpPr>
-            <a:spLocks noGrp="1"/>
-          </p:cNvSpPr>
-          <p:nvPr>
-            <p:ph type="title"/>
-          </p:nvPr>
-        </p:nvSpPr>
-        <p:spPr/>
-        <p:txBody>
-          <a:bodyPr/>
-          <a:lstStyle/>
-          <a:p>
-            <a:r>
-              <a:rPr lang="en-US" dirty="0" smtClean="0"/>
-              <a:t>Existing Work</a:t>
-            </a:r>
-            <a:endParaRPr lang="en-US" dirty="0"/>
-          </a:p>
-        </p:txBody>
-      </p:sp>
-      <p:sp>
-        <p:nvSpPr>
-          <p:cNvPr id="3" name="Content Placeholder 2"/>
-          <p:cNvSpPr>
-            <a:spLocks noGrp="1"/>
-          </p:cNvSpPr>
-          <p:nvPr>
-            <p:ph idx="1"/>
-          </p:nvPr>
-        </p:nvSpPr>
-        <p:spPr/>
-        <p:txBody>
-          <a:bodyPr>
-            <a:normAutofit/>
-          </a:bodyPr>
-          <a:lstStyle/>
-          <a:p>
-            <a:r>
-              <a:rPr lang="en-US" sz="2400" dirty="0" smtClean="0"/>
-              <a:t>Static Checkers</a:t>
-            </a:r>
-          </a:p>
-          <a:p>
-            <a:r>
-              <a:rPr lang="en-US" sz="2400" dirty="0" smtClean="0"/>
-              <a:t>Dynamic Checkers</a:t>
-            </a:r>
-          </a:p>
-          <a:p>
-            <a:r>
-              <a:rPr lang="en-US" sz="2400" dirty="0" smtClean="0"/>
-              <a:t>Console Messages</a:t>
-            </a:r>
-          </a:p>
-          <a:p>
-            <a:r>
-              <a:rPr lang="en-US" sz="2400" dirty="0" smtClean="0"/>
-              <a:t>Bug Reports</a:t>
-            </a:r>
-            <a:endParaRPr lang="en-US" sz="2400" dirty="0"/>
-          </a:p>
-        </p:txBody>
-      </p:sp>
-      <p:sp>
-        <p:nvSpPr>
-          <p:cNvPr id="6" name="Footer Placeholder 5"/>
-          <p:cNvSpPr>
-            <a:spLocks noGrp="1"/>
-          </p:cNvSpPr>
-          <p:nvPr>
-            <p:ph type="ftr" sz="quarter" idx="11"/>
-          </p:nvPr>
-        </p:nvSpPr>
-        <p:spPr/>
-        <p:txBody>
-          <a:bodyPr/>
-          <a:lstStyle/>
-          <a:p>
-            <a:r>
-              <a:rPr lang="sk-SK" smtClean="0"/>
-              <a:t>MSR 2014</a:t>
-            </a:r>
-            <a:endParaRPr lang="en-US"/>
-          </a:p>
-        </p:txBody>
-      </p:sp>
-      <p:sp>
-        <p:nvSpPr>
-          <p:cNvPr id="7" name="Slide Number Placeholder 6"/>
-          <p:cNvSpPr>
-            <a:spLocks noGrp="1"/>
-          </p:cNvSpPr>
-          <p:nvPr>
-            <p:ph type="sldNum" sz="quarter" idx="12"/>
-          </p:nvPr>
-        </p:nvSpPr>
-        <p:spPr/>
-        <p:txBody>
-          <a:bodyPr/>
-          <a:lstStyle/>
-          <a:p>
-            <a:fld id="{5FD889E0-CAB2-4699-909D-B9A88D47ACBE}" type="slidenum">
-              <a:rPr lang="en-US" smtClean="0"/>
-              <a:t>2</a:t>
-            </a:fld>
-            <a:endParaRPr lang="en-US"/>
-          </a:p>
-        </p:txBody>
-      </p:sp>
-    </p:spTree>
-    <p:extLst>
-      <p:ext uri="{BB962C8B-B14F-4D97-AF65-F5344CB8AC3E}">
-        <p14:creationId xmlns:p14="http://schemas.microsoft.com/office/powerpoint/2010/main" val="573831091"/>
-      </p:ext>
-    </p:extLst>
-  </p:cSld>
-  <p:clrMapOvr>
-    <a:masterClrMapping/>
-  </p:clrMapOvr>
-  <p:timing>
-    <p:tnLst>
-      <p:par>
-        <p:cTn xmlns:p14="http://schemas.microsoft.com/office/powerpoint/2010/main" id="1" dur="indefinite" restart="never" nodeType="tmRoot"/>
-      </p:par>
-    </p:tnLst>
-  </p:timing>
-</p:sld>
-</file>
-
 <file path=ppt/slides/slide4.xml><?xml version="1.0" encoding="utf-8"?>
 <p:sld xmlns:a="http://schemas.openxmlformats.org/drawingml/2006/main" xmlns:r="http://schemas.openxmlformats.org/officeDocument/2006/relationships" xmlns:p="http://schemas.openxmlformats.org/presentationml/2006/main">
   <p:cSld>
@@ -19345,112 +19768,34 @@
           <a:lstStyle/>
           <a:p>
             <a:r>
-              <a:rPr lang="en-US" sz="2400" dirty="0" smtClean="0">
-                <a:solidFill>
-                  <a:schemeClr val="bg1">
-                    <a:lumMod val="85000"/>
-                  </a:schemeClr>
-                </a:solidFill>
-              </a:rPr>
+              <a:rPr lang="en-US" sz="2400" dirty="0" smtClean="0"/>
               <a:t>Static Checkers</a:t>
             </a:r>
           </a:p>
           <a:p>
             <a:r>
-              <a:rPr lang="en-US" sz="2400" dirty="0" smtClean="0">
-                <a:solidFill>
-                  <a:schemeClr val="bg1">
-                    <a:lumMod val="85000"/>
-                  </a:schemeClr>
-                </a:solidFill>
-              </a:rPr>
+              <a:rPr lang="en-US" sz="2400" dirty="0" smtClean="0"/>
               <a:t>Dynamic Checkers</a:t>
             </a:r>
           </a:p>
           <a:p>
             <a:r>
-              <a:rPr lang="en-US" sz="2400" dirty="0" smtClean="0">
-                <a:solidFill>
-                  <a:schemeClr val="bg1">
-                    <a:lumMod val="85000"/>
-                  </a:schemeClr>
-                </a:solidFill>
-              </a:rPr>
+              <a:rPr lang="en-US" sz="2400" dirty="0" smtClean="0"/>
               <a:t>Console Messages</a:t>
             </a:r>
           </a:p>
           <a:p>
             <a:r>
-              <a:rPr lang="en-US" sz="2400" dirty="0" smtClean="0">
-                <a:solidFill>
-                  <a:schemeClr val="bg1">
-                    <a:lumMod val="85000"/>
-                  </a:schemeClr>
-                </a:solidFill>
-              </a:rPr>
+              <a:rPr lang="en-US" sz="2400" dirty="0" smtClean="0"/>
               <a:t>Bug Reports</a:t>
             </a:r>
-            <a:endParaRPr lang="en-US" sz="2400" dirty="0">
-              <a:solidFill>
-                <a:schemeClr val="bg1">
-                  <a:lumMod val="85000"/>
-                </a:schemeClr>
-              </a:solidFill>
-            </a:endParaRPr>
-          </a:p>
-        </p:txBody>
-      </p:sp>
-      <p:sp>
-        <p:nvSpPr>
-          <p:cNvPr id="5" name="Rectangle 4"/>
-          <p:cNvSpPr/>
-          <p:nvPr/>
-        </p:nvSpPr>
-        <p:spPr>
-          <a:xfrm>
-            <a:off x="612588" y="4766234"/>
-            <a:ext cx="7993530" cy="1673412"/>
-          </a:xfrm>
-          <a:prstGeom prst="rect">
-            <a:avLst/>
-          </a:prstGeom>
-        </p:spPr>
-        <p:style>
-          <a:lnRef idx="2">
-            <a:schemeClr val="accent1">
-              <a:shade val="50000"/>
-            </a:schemeClr>
-          </a:lnRef>
-          <a:fillRef idx="1">
-            <a:schemeClr val="accent1"/>
-          </a:fillRef>
-          <a:effectRef idx="0">
-            <a:schemeClr val="accent1"/>
-          </a:effectRef>
-          <a:fontRef idx="minor">
-            <a:schemeClr val="lt1"/>
-          </a:fontRef>
-        </p:style>
-        <p:txBody>
-          <a:bodyPr rtlCol="0" anchor="ctr"/>
-          <a:lstStyle/>
-          <a:p>
-            <a:pPr algn="ctr"/>
-            <a:r>
-              <a:rPr lang="en-US" sz="2400" dirty="0"/>
-              <a:t>No attempt to understand </a:t>
-            </a:r>
-            <a:r>
-              <a:rPr lang="en-US" sz="2400" dirty="0" smtClean="0"/>
-              <a:t>developer’s misconception </a:t>
-            </a:r>
             <a:endParaRPr lang="en-US" sz="2400" dirty="0"/>
           </a:p>
         </p:txBody>
       </p:sp>
       <p:sp>
         <p:nvSpPr>
-          <p:cNvPr id="7" name="Footer Placeholder 6"/>
+          <p:cNvPr id="6" name="Footer Placeholder 5"/>
           <p:cNvSpPr>
             <a:spLocks noGrp="1"/>
           </p:cNvSpPr>
@@ -19473,7 +19818,7 @@
       </p:sp>
       <p:sp>
         <p:nvSpPr>
-          <p:cNvPr id="8" name="Slide Number Placeholder 7"/>
+          <p:cNvPr id="7" name="Slide Number Placeholder 6"/>
           <p:cNvSpPr>
             <a:spLocks noGrp="1"/>
           </p:cNvSpPr>
@@ -19497,7 +19842,7 @@
     </p:spTree>
     <p:extLst>
       <p:ext uri="{BB962C8B-B14F-4D97-AF65-F5344CB8AC3E}">
-        <p14:creationId xmlns:p14="http://schemas.microsoft.com/office/powerpoint/2010/main" val="1294141693"/>
+        <p14:creationId xmlns:p14="http://schemas.microsoft.com/office/powerpoint/2010/main" val="573831091"/>
       </p:ext>
     </p:extLst>
   </p:cSld>
@@ -19548,7 +19893,7 @@
           <a:p>
             <a:r>
               <a:rPr lang="en-US" dirty="0" smtClean="0"/>
-              <a:t>Goal</a:t>
+              <a:t>Existing Work</a:t>
             </a:r>
             <a:endParaRPr lang="en-US" dirty="0"/>
           </a:p>
@@ -19572,8 +19917,104 @@
           <a:lstStyle/>
           <a:p>
             <a:r>
+              <a:rPr lang="en-US" sz="2400" dirty="0" smtClean="0">
+                <a:solidFill>
+                  <a:schemeClr val="bg1">
+                    <a:lumMod val="85000"/>
+                  </a:schemeClr>
+                </a:solidFill>
+              </a:rPr>
+              <a:t>Static Checkers</a:t>
+            </a:r>
+          </a:p>
+          <a:p>
+            <a:r>
+              <a:rPr lang="en-US" sz="2400" dirty="0" smtClean="0">
+                <a:solidFill>
+                  <a:schemeClr val="bg1">
+                    <a:lumMod val="85000"/>
+                  </a:schemeClr>
+                </a:solidFill>
+              </a:rPr>
+              <a:t>Dynamic Checkers</a:t>
+            </a:r>
+          </a:p>
+          <a:p>
+            <a:r>
+              <a:rPr lang="en-US" sz="2400" dirty="0" smtClean="0">
+                <a:solidFill>
+                  <a:schemeClr val="bg1">
+                    <a:lumMod val="85000"/>
+                  </a:schemeClr>
+                </a:solidFill>
+              </a:rPr>
+              <a:t>Console Messages</a:t>
+            </a:r>
+          </a:p>
+          <a:p>
+            <a:r>
+              <a:rPr lang="en-US" sz="2400" dirty="0" smtClean="0">
+                <a:solidFill>
+                  <a:schemeClr val="bg1">
+                    <a:lumMod val="85000"/>
+                  </a:schemeClr>
+                </a:solidFill>
+              </a:rPr>
+              <a:t>Bug Reports</a:t>
+            </a:r>
+            <a:endParaRPr lang="en-US" sz="2400" dirty="0">
+              <a:solidFill>
+                <a:schemeClr val="bg1">
+                  <a:lumMod val="85000"/>
+                </a:schemeClr>
+              </a:solidFill>
+            </a:endParaRPr>
+          </a:p>
+        </p:txBody>
+      </p:sp>
+      <p:sp>
+        <p:nvSpPr>
+          <p:cNvPr id="5" name="Rectangle 4"/>
+          <p:cNvSpPr/>
+          <p:nvPr/>
+        </p:nvSpPr>
+        <p:spPr>
+          <a:xfrm>
+            <a:off x="612588" y="4766234"/>
+            <a:ext cx="7993530" cy="1673412"/>
+          </a:xfrm>
+          <a:prstGeom prst="rect">
+            <a:avLst/>
+          </a:prstGeom>
+        </p:spPr>
+        <p:style>
+          <a:lnRef idx="2">
+            <a:schemeClr val="accent1">
+              <a:shade val="50000"/>
+            </a:schemeClr>
+          </a:lnRef>
+          <a:fillRef idx="1">
+            <a:schemeClr val="accent1"/>
+          </a:fillRef>
+          <a:effectRef idx="0">
+            <a:schemeClr val="accent1"/>
+          </a:effectRef>
+          <a:fontRef idx="minor">
+            <a:schemeClr val="lt1"/>
+          </a:fontRef>
+        </p:style>
+        <p:txBody>
+          <a:bodyPr rtlCol="0" anchor="ctr"/>
+          <a:lstStyle/>
+          <a:p>
+            <a:pPr algn="ctr"/>
+            <a:r>
+              <a:rPr lang="en-US" sz="2400" dirty="0"/>
+              <a:t>No attempt to understand </a:t>
+            </a:r>
+            <a:r>
               <a:rPr lang="en-US" sz="2400" dirty="0" smtClean="0"/>
-              <a:t>Understand the common challenges and/or misconceptions among web developers</a:t>
+              <a:t>developer’s misconception </a:t>
             </a:r>
             <a:endParaRPr lang="en-US" sz="2400" dirty="0"/>
           </a:p>
@@ -19581,7 +20022,7 @@
       </p:sp>
       <p:sp>
         <p:nvSpPr>
-          <p:cNvPr id="6" name="Footer Placeholder 5"/>
+          <p:cNvPr id="7" name="Footer Placeholder 6"/>
           <p:cNvSpPr>
             <a:spLocks noGrp="1"/>
           </p:cNvSpPr>
@@ -19604,7 +20045,7 @@
       </p:sp>
       <p:sp>
         <p:nvSpPr>
-          <p:cNvPr id="7" name="Slide Number Placeholder 6"/>
+          <p:cNvPr id="8" name="Slide Number Placeholder 7"/>
           <p:cNvSpPr>
             <a:spLocks noGrp="1"/>
           </p:cNvSpPr>
@@ -19628,7 +20069,7 @@
     </p:spTree>
     <p:extLst>
       <p:ext uri="{BB962C8B-B14F-4D97-AF65-F5344CB8AC3E}">
-        <p14:creationId xmlns:p14="http://schemas.microsoft.com/office/powerpoint/2010/main" val="839073372"/>
+        <p14:creationId xmlns:p14="http://schemas.microsoft.com/office/powerpoint/2010/main" val="1294141693"/>
       </p:ext>
     </p:extLst>
   </p:cSld>
@@ -19679,7 +20120,7 @@
           <a:p>
             <a:r>
               <a:rPr lang="en-US" dirty="0" smtClean="0"/>
-              <a:t>Background</a:t>
+              <a:t>Goal</a:t>
             </a:r>
             <a:endParaRPr lang="en-US" dirty="0"/>
           </a:p>
@@ -19703,55 +20144,10 @@
           <a:lstStyle/>
           <a:p>
             <a:r>
-              <a:rPr lang="en-US" sz="2400" dirty="0"/>
-              <a:t>Stack Overflow</a:t>
-            </a:r>
-          </a:p>
-          <a:p>
-            <a:pPr lvl="1"/>
-            <a:r>
-              <a:rPr lang="en-US" sz="2000" dirty="0"/>
-              <a:t>QA website for programmers</a:t>
-            </a:r>
-          </a:p>
-          <a:p>
-            <a:pPr lvl="1"/>
-            <a:r>
-              <a:rPr lang="en-US" sz="2000" dirty="0"/>
-              <a:t>Started in 2008</a:t>
-            </a:r>
-          </a:p>
-          <a:p>
-            <a:pPr lvl="1"/>
-            <a:r>
-              <a:rPr lang="en-US" sz="2000" dirty="0"/>
-              <a:t>4,125,638 questions asked from Jan’09 to Dec’12</a:t>
-            </a:r>
-          </a:p>
-          <a:p>
-            <a:pPr lvl="1"/>
-            <a:r>
-              <a:rPr lang="en-US" sz="2000" dirty="0"/>
-              <a:t>500,000+ questions related to web development</a:t>
-            </a:r>
-          </a:p>
-          <a:p>
-            <a:r>
-              <a:rPr lang="en-US" sz="2400" dirty="0"/>
-              <a:t>Questions directly asked/answered by developers</a:t>
-            </a:r>
-          </a:p>
-          <a:p>
-            <a:pPr lvl="1"/>
-            <a:r>
-              <a:rPr lang="en-US" sz="2000" dirty="0"/>
-              <a:t>Followed by discussion in </a:t>
-            </a:r>
-            <a:r>
-              <a:rPr lang="en-US" sz="2000" dirty="0" smtClean="0"/>
-              <a:t>comments</a:t>
-            </a:r>
-            <a:endParaRPr lang="en-US" sz="2000" dirty="0"/>
+              <a:rPr lang="en-US" sz="2400" dirty="0" smtClean="0"/>
+              <a:t>Understand the common challenges and/or misconceptions among web developers</a:t>
+            </a:r>
+            <a:endParaRPr lang="en-US" sz="2400" dirty="0"/>
           </a:p>
         </p:txBody>
       </p:sp>
@@ -19804,7 +20200,7 @@
     </p:spTree>
     <p:extLst>
       <p:ext uri="{BB962C8B-B14F-4D97-AF65-F5344CB8AC3E}">
-        <p14:creationId xmlns:p14="http://schemas.microsoft.com/office/powerpoint/2010/main" val="1362141015"/>
+        <p14:creationId xmlns:p14="http://schemas.microsoft.com/office/powerpoint/2010/main" val="839073372"/>
       </p:ext>
     </p:extLst>
   </p:cSld>
@@ -19879,145 +20275,61 @@
           <a:lstStyle/>
           <a:p>
             <a:r>
-              <a:rPr lang="en-US" sz="2400" dirty="0">
-                <a:solidFill>
-                  <a:srgbClr val="D9D9D9"/>
-                </a:solidFill>
-              </a:rPr>
+              <a:rPr lang="en-US" sz="2400" dirty="0"/>
               <a:t>Stack Overflow</a:t>
             </a:r>
           </a:p>
           <a:p>
             <a:pPr lvl="1"/>
             <a:r>
-              <a:rPr lang="en-US" sz="2000" dirty="0">
-                <a:solidFill>
-                  <a:srgbClr val="D9D9D9"/>
-                </a:solidFill>
-              </a:rPr>
+              <a:rPr lang="en-US" sz="2000" dirty="0"/>
               <a:t>QA website for programmers</a:t>
             </a:r>
           </a:p>
           <a:p>
             <a:pPr lvl="1"/>
             <a:r>
-              <a:rPr lang="en-US" sz="2000" dirty="0">
-                <a:solidFill>
-                  <a:srgbClr val="D9D9D9"/>
-                </a:solidFill>
-              </a:rPr>
+              <a:rPr lang="en-US" sz="2000" dirty="0"/>
               <a:t>Started in 2008</a:t>
             </a:r>
           </a:p>
           <a:p>
             <a:pPr lvl="1"/>
             <a:r>
-              <a:rPr lang="en-US" sz="2000" dirty="0">
-                <a:solidFill>
-                  <a:srgbClr val="D9D9D9"/>
-                </a:solidFill>
-              </a:rPr>
+              <a:rPr lang="en-US" sz="2000" dirty="0"/>
               <a:t>4,125,638 questions asked from Jan’09 to Dec’12</a:t>
             </a:r>
           </a:p>
           <a:p>
             <a:pPr lvl="1"/>
             <a:r>
-              <a:rPr lang="en-US" sz="2000" dirty="0">
-                <a:solidFill>
-                  <a:srgbClr val="D9D9D9"/>
-                </a:solidFill>
-              </a:rPr>
+              <a:rPr lang="en-US" sz="2000" dirty="0"/>
               <a:t>500,000+ questions related to web development</a:t>
             </a:r>
           </a:p>
           <a:p>
             <a:r>
-              <a:rPr lang="en-US" sz="2400" dirty="0">
-                <a:solidFill>
-                  <a:srgbClr val="D9D9D9"/>
-                </a:solidFill>
-              </a:rPr>
+              <a:rPr lang="en-US" sz="2400" dirty="0"/>
               <a:t>Questions directly asked/answered by developers</a:t>
             </a:r>
           </a:p>
           <a:p>
             <a:pPr lvl="1"/>
             <a:r>
-              <a:rPr lang="en-US" sz="2000" dirty="0">
-                <a:solidFill>
-                  <a:srgbClr val="D9D9D9"/>
-                </a:solidFill>
-              </a:rPr>
+              <a:rPr lang="en-US" sz="2000" dirty="0"/>
               <a:t>Followed by discussion in </a:t>
             </a:r>
             <a:r>
-              <a:rPr lang="en-US" sz="2000" dirty="0" smtClean="0">
-                <a:solidFill>
-                  <a:srgbClr val="D9D9D9"/>
-                </a:solidFill>
-              </a:rPr>
+              <a:rPr lang="en-US" sz="2000" dirty="0" smtClean="0"/>
               <a:t>comments</a:t>
             </a:r>
-            <a:endParaRPr lang="en-US" sz="2000" dirty="0">
-              <a:solidFill>
-                <a:srgbClr val="D9D9D9"/>
-              </a:solidFill>
-            </a:endParaRPr>
-          </a:p>
-        </p:txBody>
-      </p:sp>
-      <p:sp>
-        <p:nvSpPr>
-          <p:cNvPr id="5" name="Rectangle 4"/>
-          <p:cNvSpPr/>
-          <p:nvPr/>
-        </p:nvSpPr>
-        <p:spPr>
-          <a:xfrm>
-            <a:off x="612588" y="4781724"/>
-            <a:ext cx="7993530" cy="1673412"/>
-          </a:xfrm>
-          <a:prstGeom prst="rect">
-            <a:avLst/>
-          </a:prstGeom>
-        </p:spPr>
-        <p:style>
-          <a:lnRef idx="2">
-            <a:schemeClr val="accent1">
-              <a:shade val="50000"/>
-            </a:schemeClr>
-          </a:lnRef>
-          <a:fillRef idx="1">
-            <a:schemeClr val="accent1"/>
-          </a:fillRef>
-          <a:effectRef idx="0">
-            <a:schemeClr val="accent1"/>
-          </a:effectRef>
-          <a:fontRef idx="minor">
-            <a:schemeClr val="lt1"/>
-          </a:fontRef>
-        </p:style>
-        <p:txBody>
-          <a:bodyPr rtlCol="0" anchor="ctr"/>
-          <a:lstStyle/>
-          <a:p>
-            <a:pPr algn="ctr"/>
-            <a:r>
-              <a:rPr lang="en-US" sz="2400" dirty="0" err="1" smtClean="0"/>
-              <a:t>StackOverflow</a:t>
-            </a:r>
-            <a:r>
-              <a:rPr lang="en-US" sz="2400" dirty="0" smtClean="0"/>
-              <a:t> provides sufficient data for analysis</a:t>
-            </a:r>
-            <a:endParaRPr lang="en-US" sz="2400" dirty="0"/>
-          </a:p>
-        </p:txBody>
-      </p:sp>
-      <p:sp>
-        <p:nvSpPr>
-          <p:cNvPr id="7" name="Footer Placeholder 6"/>
+            <a:endParaRPr lang="en-US" sz="2000" dirty="0"/>
+          </a:p>
+        </p:txBody>
+      </p:sp>
+      <p:sp>
+        <p:nvSpPr>
+          <p:cNvPr id="6" name="Footer Placeholder 5"/>
           <p:cNvSpPr>
             <a:spLocks noGrp="1"/>
           </p:cNvSpPr>
@@ -20040,7 +20352,7 @@
       </p:sp>
       <p:sp>
         <p:nvSpPr>
-          <p:cNvPr id="8" name="Slide Number Placeholder 7"/>
+          <p:cNvPr id="7" name="Slide Number Placeholder 6"/>
           <p:cNvSpPr>
             <a:spLocks noGrp="1"/>
           </p:cNvSpPr>
@@ -20064,7 +20376,7 @@
     </p:spTree>
     <p:extLst>
       <p:ext uri="{BB962C8B-B14F-4D97-AF65-F5344CB8AC3E}">
-        <p14:creationId xmlns:p14="http://schemas.microsoft.com/office/powerpoint/2010/main" val="1928539680"/>
+        <p14:creationId xmlns:p14="http://schemas.microsoft.com/office/powerpoint/2010/main" val="1362141015"/>
       </p:ext>
     </p:extLst>
   </p:cSld>
@@ -20115,7 +20427,7 @@
           <a:p>
             <a:r>
               <a:rPr lang="en-US" dirty="0" smtClean="0"/>
-              <a:t>Straw man Approach</a:t>
+              <a:t>Background</a:t>
             </a:r>
             <a:endParaRPr lang="en-US" dirty="0"/>
           </a:p>
@@ -20139,25 +20451,145 @@
           <a:lstStyle/>
           <a:p>
             <a:r>
+              <a:rPr lang="en-US" sz="2400" dirty="0">
+                <a:solidFill>
+                  <a:srgbClr val="D9D9D9"/>
+                </a:solidFill>
+              </a:rPr>
+              <a:t>Stack Overflow</a:t>
+            </a:r>
+          </a:p>
+          <a:p>
+            <a:pPr lvl="1"/>
+            <a:r>
+              <a:rPr lang="en-US" sz="2000" dirty="0">
+                <a:solidFill>
+                  <a:srgbClr val="D9D9D9"/>
+                </a:solidFill>
+              </a:rPr>
+              <a:t>QA website for programmers</a:t>
+            </a:r>
+          </a:p>
+          <a:p>
+            <a:pPr lvl="1"/>
+            <a:r>
+              <a:rPr lang="en-US" sz="2000" dirty="0">
+                <a:solidFill>
+                  <a:srgbClr val="D9D9D9"/>
+                </a:solidFill>
+              </a:rPr>
+              <a:t>Started in 2008</a:t>
+            </a:r>
+          </a:p>
+          <a:p>
+            <a:pPr lvl="1"/>
+            <a:r>
+              <a:rPr lang="en-US" sz="2000" dirty="0">
+                <a:solidFill>
+                  <a:srgbClr val="D9D9D9"/>
+                </a:solidFill>
+              </a:rPr>
+              <a:t>4,125,638 questions asked from Jan’09 to Dec’12</a:t>
+            </a:r>
+          </a:p>
+          <a:p>
+            <a:pPr lvl="1"/>
+            <a:r>
+              <a:rPr lang="en-US" sz="2000" dirty="0">
+                <a:solidFill>
+                  <a:srgbClr val="D9D9D9"/>
+                </a:solidFill>
+              </a:rPr>
+              <a:t>500,000+ questions related to web development</a:t>
+            </a:r>
+          </a:p>
+          <a:p>
+            <a:r>
+              <a:rPr lang="en-US" sz="2400" dirty="0">
+                <a:solidFill>
+                  <a:srgbClr val="D9D9D9"/>
+                </a:solidFill>
+              </a:rPr>
+              <a:t>Questions directly asked/answered by developers</a:t>
+            </a:r>
+          </a:p>
+          <a:p>
+            <a:pPr lvl="1"/>
+            <a:r>
+              <a:rPr lang="en-US" sz="2000" dirty="0">
+                <a:solidFill>
+                  <a:srgbClr val="D9D9D9"/>
+                </a:solidFill>
+              </a:rPr>
+              <a:t>Followed by discussion in </a:t>
+            </a:r>
+            <a:r>
+              <a:rPr lang="en-US" sz="2000" dirty="0" smtClean="0">
+                <a:solidFill>
+                  <a:srgbClr val="D9D9D9"/>
+                </a:solidFill>
+              </a:rPr>
+              <a:t>comments</a:t>
+            </a:r>
+            <a:endParaRPr lang="en-US" sz="2000" dirty="0">
+              <a:solidFill>
+                <a:srgbClr val="D9D9D9"/>
+              </a:solidFill>
+            </a:endParaRPr>
+          </a:p>
+        </p:txBody>
+      </p:sp>
+      <p:sp>
+        <p:nvSpPr>
+          <p:cNvPr id="5" name="Rectangle 4"/>
+          <p:cNvSpPr/>
+          <p:nvPr/>
+        </p:nvSpPr>
+        <p:spPr>
+          <a:xfrm>
+            <a:off x="612588" y="4781724"/>
+            <a:ext cx="7993530" cy="1673412"/>
+          </a:xfrm>
+          <a:prstGeom prst="rect">
+            <a:avLst/>
+          </a:prstGeom>
+        </p:spPr>
+        <p:style>
+          <a:lnRef idx="2">
+            <a:schemeClr val="accent1">
+              <a:shade val="50000"/>
+            </a:schemeClr>
+          </a:lnRef>
+          <a:fillRef idx="1">
+            <a:schemeClr val="accent1"/>
+          </a:fillRef>
+          <a:effectRef idx="0">
+            <a:schemeClr val="accent1"/>
+          </a:effectRef>
+          <a:fontRef idx="minor">
+            <a:schemeClr val="lt1"/>
+          </a:fontRef>
+        </p:style>
+        <p:txBody>
+          <a:bodyPr rtlCol="0" anchor="ctr"/>
+          <a:lstStyle/>
+          <a:p>
+            <a:pPr algn="ctr"/>
+            <a:r>
+              <a:rPr lang="en-US" sz="2400" dirty="0" err="1" smtClean="0"/>
+              <a:t>StackOverflow</a:t>
+            </a:r>
+            <a:r>
               <a:rPr lang="en-US" sz="2400" dirty="0" smtClean="0"/>
-              <a:t>Categorization based on tags attached to each question</a:t>
-            </a:r>
-          </a:p>
-          <a:p>
-            <a:r>
-              <a:rPr lang="en-US" sz="2400" dirty="0" smtClean="0"/>
-              <a:t>Can provide an overview of major topics of discussion</a:t>
+              <a:t> provides sufficient data for analysis</a:t>
             </a:r>
             <a:endParaRPr lang="en-US" sz="2400" dirty="0"/>
           </a:p>
-          <a:p>
-            <a:endParaRPr lang="en-US" sz="2400" dirty="0"/>
-          </a:p>
-        </p:txBody>
-      </p:sp>
-      <p:sp>
-        <p:nvSpPr>
-          <p:cNvPr id="6" name="Footer Placeholder 5"/>
+        </p:txBody>
+      </p:sp>
+      <p:sp>
+        <p:nvSpPr>
+          <p:cNvPr id="7" name="Footer Placeholder 6"/>
           <p:cNvSpPr>
             <a:spLocks noGrp="1"/>
           </p:cNvSpPr>
@@ -20180,7 +20612,7 @@
       </p:sp>
       <p:sp>
         <p:nvSpPr>
-          <p:cNvPr id="7" name="Slide Number Placeholder 6"/>
+          <p:cNvPr id="8" name="Slide Number Placeholder 7"/>
           <p:cNvSpPr>
             <a:spLocks noGrp="1"/>
           </p:cNvSpPr>
@@ -20204,7 +20636,7 @@
     </p:spTree>
     <p:extLst>
       <p:ext uri="{BB962C8B-B14F-4D97-AF65-F5344CB8AC3E}">
-        <p14:creationId xmlns:p14="http://schemas.microsoft.com/office/powerpoint/2010/main" val="3434632297"/>
+        <p14:creationId xmlns:p14="http://schemas.microsoft.com/office/powerpoint/2010/main" val="1928539680"/>
       </p:ext>
     </p:extLst>
   </p:cSld>
@@ -20279,81 +20711,25 @@
           <a:lstStyle/>
           <a:p>
             <a:r>
-              <a:rPr lang="en-US" sz="2400" dirty="0" smtClean="0">
-                <a:solidFill>
-                  <a:srgbClr val="D9D9D9"/>
-                </a:solidFill>
-              </a:rPr>
+              <a:rPr lang="en-US" sz="2400" dirty="0" smtClean="0"/>
               <a:t>Categorization based on tags attached to each question</a:t>
             </a:r>
           </a:p>
           <a:p>
             <a:r>
-              <a:rPr lang="en-US" sz="2400" dirty="0" smtClean="0">
-                <a:solidFill>
-                  <a:srgbClr val="D9D9D9"/>
-                </a:solidFill>
-              </a:rPr>
+              <a:rPr lang="en-US" sz="2400" dirty="0" smtClean="0"/>
               <a:t>Can provide an overview of major topics of discussion</a:t>
             </a:r>
-            <a:endParaRPr lang="en-US" sz="2400" dirty="0">
-              <a:solidFill>
-                <a:srgbClr val="D9D9D9"/>
-              </a:solidFill>
-            </a:endParaRPr>
-          </a:p>
-          <a:p>
             <a:endParaRPr lang="en-US" sz="2400" dirty="0"/>
           </a:p>
-        </p:txBody>
-      </p:sp>
-      <p:sp>
-        <p:nvSpPr>
-          <p:cNvPr id="5" name="Rectangle 4"/>
-          <p:cNvSpPr/>
-          <p:nvPr/>
-        </p:nvSpPr>
-        <p:spPr>
-          <a:xfrm>
-            <a:off x="612588" y="4766234"/>
-            <a:ext cx="7993530" cy="1673412"/>
-          </a:xfrm>
-          <a:prstGeom prst="rect">
-            <a:avLst/>
-          </a:prstGeom>
-        </p:spPr>
-        <p:style>
-          <a:lnRef idx="2">
-            <a:schemeClr val="accent1">
-              <a:shade val="50000"/>
-            </a:schemeClr>
-          </a:lnRef>
-          <a:fillRef idx="1">
-            <a:schemeClr val="accent1"/>
-          </a:fillRef>
-          <a:effectRef idx="0">
-            <a:schemeClr val="accent1"/>
-          </a:effectRef>
-          <a:fontRef idx="minor">
-            <a:schemeClr val="lt1"/>
-          </a:fontRef>
-        </p:style>
-        <p:txBody>
-          <a:bodyPr rtlCol="0" anchor="ctr"/>
-          <a:lstStyle/>
-          <a:p>
-            <a:pPr algn="ctr"/>
-            <a:r>
-              <a:rPr lang="en-US" sz="2400" dirty="0" smtClean="0"/>
-              <a:t>How appropriate are tags?</a:t>
-            </a:r>
+          <a:p>
             <a:endParaRPr lang="en-US" sz="2400" dirty="0"/>
           </a:p>
         </p:txBody>
       </p:sp>
       <p:sp>
         <p:nvSpPr>
-          <p:cNvPr id="7" name="Footer Placeholder 6"/>
+          <p:cNvPr id="6" name="Footer Placeholder 5"/>
           <p:cNvSpPr>
             <a:spLocks noGrp="1"/>
           </p:cNvSpPr>
@@ -20376,7 +20752,7 @@
       </p:sp>
       <p:sp>
         <p:nvSpPr>
-          <p:cNvPr id="8" name="Slide Number Placeholder 7"/>
+          <p:cNvPr id="7" name="Slide Number Placeholder 6"/>
           <p:cNvSpPr>
             <a:spLocks noGrp="1"/>
           </p:cNvSpPr>
@@ -20400,7 +20776,7 @@
     </p:spTree>
     <p:extLst>
       <p:ext uri="{BB962C8B-B14F-4D97-AF65-F5344CB8AC3E}">
-        <p14:creationId xmlns:p14="http://schemas.microsoft.com/office/powerpoint/2010/main" val="822971014"/>
+        <p14:creationId xmlns:p14="http://schemas.microsoft.com/office/powerpoint/2010/main" val="3434632297"/>
       </p:ext>
     </p:extLst>
   </p:cSld>

</xml_diff>